<commit_message>
Update PPT & ProjetPro
</commit_message>
<xml_diff>
--- a/ProjetTof’Box.pptx
+++ b/ProjetTof’Box.pptx
@@ -3238,15 +3238,7 @@
           </a:r>
           <a:r>
             <a:rPr lang="fr-FR" dirty="0"/>
-            <a:t> est un réseau social de photographie permettant de voir, de partager des photos et d’</a:t>
-          </a:r>
-          <a:r>
-            <a:rPr lang="fr-FR" dirty="0" err="1"/>
-            <a:t>intéragir</a:t>
-          </a:r>
-          <a:r>
-            <a:rPr lang="fr-FR" dirty="0"/>
-            <a:t> autour de celles-ci.</a:t>
+            <a:t> est un réseau social de photographie permettant de voir, de partager des photos et d’interagir autour de celles-ci.</a:t>
           </a:r>
         </a:p>
       </dgm:t>
@@ -3286,10 +3278,10 @@
             </a:lnSpc>
           </a:pPr>
           <a:r>
-            <a:rPr lang="fr-FR"/>
-            <a:t>Selon le cadre dans lequel il est mis en place ce projet peut s’adresser a un public large ou a une association de photographes par exemple</a:t>
+            <a:rPr lang="fr-FR" dirty="0"/>
+            <a:t>Selon le cadre dans lequel il est mis en place ce projet peut s’adresser à un public large ou à une association de photographes, par exemple</a:t>
           </a:r>
-          <a:endParaRPr lang="en-US"/>
+          <a:endParaRPr lang="en-US" dirty="0"/>
         </a:p>
       </dgm:t>
     </dgm:pt>
@@ -3633,7 +3625,7 @@
         <a:p>
           <a:r>
             <a:rPr lang="fr-FR" b="1" dirty="0"/>
-            <a:t>Anonyme</a:t>
+            <a:t>Non connecté</a:t>
           </a:r>
         </a:p>
       </dgm:t>
@@ -3819,7 +3811,7 @@
         <a:p>
           <a:r>
             <a:rPr lang="fr-FR" sz="2800" dirty="0"/>
-            <a:t>Symfony reconnaît cette méthode grâce au système de Route</a:t>
+            <a:t>Symfony reconnaît cette méthode grâce au système de Route.</a:t>
           </a:r>
         </a:p>
       </dgm:t>
@@ -4052,7 +4044,13 @@
         <a:p>
           <a:r>
             <a:rPr lang="fr-FR" dirty="0"/>
-            <a:t>Il va donc récupérer la requête, exécuter un ensemble de sous-requête pour récupérer les informations dont il a besoin pour afficher la page demandée. Pour cela, il va faire appel au Repository.</a:t>
+            <a:t>Il va donc récupérer la requête, exécuter un ensemble de sous-requête pour récupérer les informations dont il a besoin pour afficher la page demandée.</a:t>
+          </a:r>
+        </a:p>
+        <a:p>
+          <a:r>
+            <a:rPr lang="fr-FR" dirty="0"/>
+            <a:t>Pour cela, il va faire appel au Repository.</a:t>
           </a:r>
         </a:p>
       </dgm:t>
@@ -4292,15 +4290,7 @@
           </a:r>
           <a:r>
             <a:rPr lang="fr-FR" sz="2100" kern="1200" dirty="0"/>
-            <a:t> est un réseau social de photographie permettant de voir, de partager des photos et d’</a:t>
-          </a:r>
-          <a:r>
-            <a:rPr lang="fr-FR" sz="2100" kern="1200" dirty="0" err="1"/>
-            <a:t>intéragir</a:t>
-          </a:r>
-          <a:r>
-            <a:rPr lang="fr-FR" sz="2100" kern="1200" dirty="0"/>
-            <a:t> autour de celles-ci.</a:t>
+            <a:t> est un réseau social de photographie permettant de voir, de partager des photos et d’interagir autour de celles-ci.</a:t>
           </a:r>
         </a:p>
       </dsp:txBody>
@@ -4458,10 +4448,10 @@
             <a:buNone/>
           </a:pPr>
           <a:r>
-            <a:rPr lang="fr-FR" sz="2100" kern="1200"/>
-            <a:t>Selon le cadre dans lequel il est mis en place ce projet peut s’adresser a un public large ou a une association de photographes par exemple</a:t>
+            <a:rPr lang="fr-FR" sz="2100" kern="1200" dirty="0"/>
+            <a:t>Selon le cadre dans lequel il est mis en place ce projet peut s’adresser à un public large ou à une association de photographes, par exemple</a:t>
           </a:r>
-          <a:endParaRPr lang="en-US" sz="2100" kern="1200"/>
+          <a:endParaRPr lang="en-US" sz="2100" kern="1200" dirty="0"/>
         </a:p>
       </dsp:txBody>
       <dsp:txXfrm>
@@ -4721,7 +4711,7 @@
           </a:pPr>
           <a:r>
             <a:rPr lang="fr-FR" sz="1400" b="1" kern="1200" dirty="0"/>
-            <a:t>Anonyme</a:t>
+            <a:t>Non connecté</a:t>
           </a:r>
         </a:p>
       </dsp:txBody>
@@ -4750,7 +4740,7 @@
       <dsp:spPr>
         <a:xfrm>
           <a:off x="0" y="0"/>
-          <a:ext cx="6413500" cy="2449513"/>
+          <a:ext cx="6413500" cy="2449333"/>
         </a:xfrm>
         <a:prstGeom prst="roundRect">
           <a:avLst/>
@@ -4823,13 +4813,13 @@
           </a:pPr>
           <a:r>
             <a:rPr lang="fr-FR" sz="2800" kern="1200" dirty="0"/>
-            <a:t>Symfony reconnaît cette méthode grâce au système de Route</a:t>
+            <a:t>Symfony reconnaît cette méthode grâce au système de Route.</a:t>
           </a:r>
         </a:p>
       </dsp:txBody>
       <dsp:txXfrm>
-        <a:off x="119575" y="119575"/>
-        <a:ext cx="6174350" cy="2210363"/>
+        <a:off x="119567" y="119567"/>
+        <a:ext cx="6174366" cy="2210199"/>
       </dsp:txXfrm>
     </dsp:sp>
     <dsp:sp modelId="{2C8BDE9D-3836-48CC-A9DB-59054019079D}">
@@ -4839,8 +4829,8 @@
       </dsp:nvSpPr>
       <dsp:spPr>
         <a:xfrm>
-          <a:off x="0" y="2711645"/>
-          <a:ext cx="6413500" cy="2685744"/>
+          <a:off x="0" y="2711478"/>
+          <a:ext cx="6413500" cy="2685547"/>
         </a:xfrm>
         <a:prstGeom prst="roundRect">
           <a:avLst/>
@@ -4930,8 +4920,8 @@
         </a:p>
       </dsp:txBody>
       <dsp:txXfrm>
-        <a:off x="131107" y="2842752"/>
-        <a:ext cx="6151286" cy="2423530"/>
+        <a:off x="131098" y="2842576"/>
+        <a:ext cx="6151304" cy="2423351"/>
       </dsp:txXfrm>
     </dsp:sp>
   </dsp:spTree>
@@ -4953,8 +4943,8 @@
       </dsp:nvSpPr>
       <dsp:spPr>
         <a:xfrm>
-          <a:off x="0" y="34049"/>
-          <a:ext cx="6413663" cy="2405812"/>
+          <a:off x="0" y="0"/>
+          <a:ext cx="6413663" cy="2598277"/>
         </a:xfrm>
         <a:prstGeom prst="roundRect">
           <a:avLst/>
@@ -5017,8 +5007,8 @@
         </a:p>
       </dsp:txBody>
       <dsp:txXfrm>
-        <a:off x="117442" y="151491"/>
-        <a:ext cx="6178779" cy="2170928"/>
+        <a:off x="126837" y="126837"/>
+        <a:ext cx="6159989" cy="2344603"/>
       </dsp:txXfrm>
     </dsp:sp>
     <dsp:sp modelId="{DD4F2317-82B1-4AEF-8408-855C145452CD}">
@@ -5029,7 +5019,7 @@
       <dsp:spPr>
         <a:xfrm>
           <a:off x="0" y="2831982"/>
-          <a:ext cx="6413663" cy="2405812"/>
+          <a:ext cx="6413663" cy="2598277"/>
         </a:xfrm>
         <a:prstGeom prst="roundRect">
           <a:avLst/>
@@ -5079,13 +5069,31 @@
           </a:pPr>
           <a:r>
             <a:rPr lang="fr-FR" sz="2800" kern="1200" dirty="0"/>
-            <a:t>Il va donc récupérer la requête, exécuter un ensemble de sous-requête pour récupérer les informations dont il a besoin pour afficher la page demandée. Pour cela, il va faire appel au Repository.</a:t>
+            <a:t>Il va donc récupérer la requête, exécuter un ensemble de sous-requête pour récupérer les informations dont il a besoin pour afficher la page demandée.</a:t>
+          </a:r>
+        </a:p>
+        <a:p>
+          <a:pPr marL="0" lvl="0" indent="0" algn="l" defTabSz="1244600">
+            <a:lnSpc>
+              <a:spcPct val="90000"/>
+            </a:lnSpc>
+            <a:spcBef>
+              <a:spcPct val="0"/>
+            </a:spcBef>
+            <a:spcAft>
+              <a:spcPct val="35000"/>
+            </a:spcAft>
+            <a:buNone/>
+          </a:pPr>
+          <a:r>
+            <a:rPr lang="fr-FR" sz="2800" kern="1200" dirty="0"/>
+            <a:t>Pour cela, il va faire appel au Repository.</a:t>
           </a:r>
         </a:p>
       </dsp:txBody>
       <dsp:txXfrm>
-        <a:off x="117442" y="2949424"/>
-        <a:ext cx="6178779" cy="2170928"/>
+        <a:off x="126837" y="2958819"/>
+        <a:ext cx="6159989" cy="2344603"/>
       </dsp:txXfrm>
     </dsp:sp>
   </dsp:spTree>
@@ -10664,7 +10672,7 @@
           <a:p>
             <a:fld id="{A92484F3-E9B1-4147-BA48-FC09D99FF563}" type="datetimeFigureOut">
               <a:rPr lang="fr-FR" smtClean="0"/>
-              <a:t>04/06/2020</a:t>
+              <a:t>07/06/2020</a:t>
             </a:fld>
             <a:endParaRPr lang="fr-FR"/>
           </a:p>
@@ -10842,7 +10850,7 @@
           <a:p>
             <a:fld id="{04B58477-CB09-4F23-A236-9E87FF4CBDB9}" type="datetimeFigureOut">
               <a:rPr lang="fr-FR" smtClean="0"/>
-              <a:t>04/06/2020</a:t>
+              <a:t>07/06/2020</a:t>
             </a:fld>
             <a:endParaRPr lang="fr-FR"/>
           </a:p>
@@ -11687,7 +11695,7 @@
           <a:p>
             <a:fld id="{09181184-F05B-400A-8A17-582BFB35CEC7}" type="datetime1">
               <a:rPr lang="fr-FR" smtClean="0"/>
-              <a:t>04/06/2020</a:t>
+              <a:t>07/06/2020</a:t>
             </a:fld>
             <a:endParaRPr lang="fr-FR"/>
           </a:p>
@@ -11898,7 +11906,7 @@
           <a:p>
             <a:fld id="{17B14172-D5F5-4BFB-89B6-FE98C0A91CE9}" type="datetime1">
               <a:rPr lang="fr-FR" smtClean="0"/>
-              <a:t>04/06/2020</a:t>
+              <a:t>07/06/2020</a:t>
             </a:fld>
             <a:endParaRPr lang="fr-FR"/>
           </a:p>
@@ -12158,7 +12166,7 @@
           <a:p>
             <a:fld id="{17B14172-D5F5-4BFB-89B6-FE98C0A91CE9}" type="datetime1">
               <a:rPr lang="fr-FR" smtClean="0"/>
-              <a:t>04/06/2020</a:t>
+              <a:t>07/06/2020</a:t>
             </a:fld>
             <a:endParaRPr lang="fr-FR"/>
           </a:p>
@@ -12332,7 +12340,7 @@
           <a:p>
             <a:fld id="{17B14172-D5F5-4BFB-89B6-FE98C0A91CE9}" type="datetime1">
               <a:rPr lang="fr-FR" smtClean="0"/>
-              <a:t>04/06/2020</a:t>
+              <a:t>07/06/2020</a:t>
             </a:fld>
             <a:endParaRPr lang="fr-FR"/>
           </a:p>
@@ -12679,7 +12687,7 @@
           <a:p>
             <a:fld id="{EE75921B-C4F6-4949-BEE6-7B8822AEE9B3}" type="datetime1">
               <a:rPr lang="fr-FR" smtClean="0"/>
-              <a:t>04/06/2020</a:t>
+              <a:t>07/06/2020</a:t>
             </a:fld>
             <a:endParaRPr lang="fr-FR"/>
           </a:p>
@@ -12957,7 +12965,7 @@
           <a:p>
             <a:fld id="{17B14172-D5F5-4BFB-89B6-FE98C0A91CE9}" type="datetime1">
               <a:rPr lang="fr-FR" smtClean="0"/>
-              <a:t>04/06/2020</a:t>
+              <a:t>07/06/2020</a:t>
             </a:fld>
             <a:endParaRPr lang="fr-FR"/>
           </a:p>
@@ -13340,7 +13348,7 @@
           <a:p>
             <a:fld id="{17B14172-D5F5-4BFB-89B6-FE98C0A91CE9}" type="datetime1">
               <a:rPr lang="fr-FR" smtClean="0"/>
-              <a:t>04/06/2020</a:t>
+              <a:t>07/06/2020</a:t>
             </a:fld>
             <a:endParaRPr lang="fr-FR"/>
           </a:p>
@@ -13462,7 +13470,7 @@
           <a:p>
             <a:fld id="{919D7D2C-C368-49AA-ABB9-59757E9049E2}" type="datetime1">
               <a:rPr lang="fr-FR" smtClean="0"/>
-              <a:t>04/06/2020</a:t>
+              <a:t>07/06/2020</a:t>
             </a:fld>
             <a:endParaRPr lang="fr-FR"/>
           </a:p>
@@ -13636,7 +13644,7 @@
           <a:p>
             <a:fld id="{772202B7-1C66-4DE8-B9AF-37C9BE30BA80}" type="datetime1">
               <a:rPr lang="fr-FR" smtClean="0"/>
-              <a:t>04/06/2020</a:t>
+              <a:t>07/06/2020</a:t>
             </a:fld>
             <a:endParaRPr lang="fr-FR"/>
           </a:p>
@@ -13993,7 +14001,7 @@
           <a:p>
             <a:fld id="{17B14172-D5F5-4BFB-89B6-FE98C0A91CE9}" type="datetime1">
               <a:rPr lang="fr-FR" smtClean="0"/>
-              <a:t>04/06/2020</a:t>
+              <a:t>07/06/2020</a:t>
             </a:fld>
             <a:endParaRPr lang="fr-FR"/>
           </a:p>
@@ -14374,7 +14382,7 @@
           <a:p>
             <a:fld id="{14BC84F3-64A9-4428-BDB0-8FB8732EE96B}" type="datetime1">
               <a:rPr lang="fr-FR" smtClean="0"/>
-              <a:t>04/06/2020</a:t>
+              <a:t>07/06/2020</a:t>
             </a:fld>
             <a:endParaRPr lang="fr-FR"/>
           </a:p>
@@ -14664,7 +14672,7 @@
           <a:p>
             <a:fld id="{17B14172-D5F5-4BFB-89B6-FE98C0A91CE9}" type="datetime1">
               <a:rPr lang="fr-FR" smtClean="0"/>
-              <a:t>04/06/2020</a:t>
+              <a:t>07/06/2020</a:t>
             </a:fld>
             <a:endParaRPr lang="fr-FR"/>
           </a:p>
@@ -15556,7 +15564,7 @@
                   <a:spcPts val="600"/>
                 </a:spcAft>
               </a:pPr>
-              <a:t>04/06/2020</a:t>
+              <a:t>07/06/2020</a:t>
             </a:fld>
             <a:endParaRPr lang="fr-FR"/>
           </a:p>
@@ -16222,7 +16230,7 @@
                   <a:spcPts val="600"/>
                 </a:spcAft>
               </a:pPr>
-              <a:t>6/4/2020</a:t>
+              <a:t>6/7/2020</a:t>
             </a:fld>
             <a:endParaRPr lang="en-US"/>
           </a:p>
@@ -16801,7 +16809,7 @@
                   <a:spcPts val="600"/>
                 </a:spcAft>
               </a:pPr>
-              <a:t>6/4/2020</a:t>
+              <a:t>6/7/2020</a:t>
             </a:fld>
             <a:endParaRPr lang="en-US"/>
           </a:p>
@@ -17046,7 +17054,7 @@
           <a:p>
             <a:fld id="{17B14172-D5F5-4BFB-89B6-FE98C0A91CE9}" type="datetime1">
               <a:rPr lang="fr-FR" smtClean="0"/>
-              <a:t>04/06/2020</a:t>
+              <a:t>07/06/2020</a:t>
             </a:fld>
             <a:endParaRPr lang="fr-FR"/>
           </a:p>
@@ -17247,7 +17255,7 @@
           <a:p>
             <a:fld id="{17B14172-D5F5-4BFB-89B6-FE98C0A91CE9}" type="datetime1">
               <a:rPr lang="fr-FR" smtClean="0"/>
-              <a:t>04/06/2020</a:t>
+              <a:t>07/06/2020</a:t>
             </a:fld>
             <a:endParaRPr lang="fr-FR"/>
           </a:p>
@@ -17483,7 +17491,7 @@
           <a:p>
             <a:fld id="{17B14172-D5F5-4BFB-89B6-FE98C0A91CE9}" type="datetime1">
               <a:rPr lang="fr-FR" smtClean="0"/>
-              <a:t>04/06/2020</a:t>
+              <a:t>07/06/2020</a:t>
             </a:fld>
             <a:endParaRPr lang="fr-FR"/>
           </a:p>
@@ -18115,7 +18123,7 @@
                   <a:spcPts val="600"/>
                 </a:spcAft>
               </a:pPr>
-              <a:t>6/4/2020</a:t>
+              <a:t>6/7/2020</a:t>
             </a:fld>
             <a:endParaRPr lang="en-US"/>
           </a:p>
@@ -18267,7 +18275,7 @@
           <a:p>
             <a:fld id="{EE75921B-C4F6-4949-BEE6-7B8822AEE9B3}" type="datetime1">
               <a:rPr lang="fr-FR" smtClean="0"/>
-              <a:t>04/06/2020</a:t>
+              <a:t>07/06/2020</a:t>
             </a:fld>
             <a:endParaRPr lang="fr-FR"/>
           </a:p>
@@ -18446,7 +18454,7 @@
         </p:nvGrpSpPr>
         <p:grpSpPr>
           <a:xfrm>
-            <a:off x="2868717" y="2689327"/>
+            <a:off x="3569551" y="2212206"/>
             <a:ext cx="520117" cy="501242"/>
             <a:chOff x="2868717" y="2689327"/>
             <a:chExt cx="520117" cy="501242"/>
@@ -18562,7 +18570,7 @@
         </p:nvGrpSpPr>
         <p:grpSpPr>
           <a:xfrm>
-            <a:off x="5760440" y="1536061"/>
+            <a:off x="6364207" y="1478315"/>
             <a:ext cx="520117" cy="501242"/>
             <a:chOff x="5760440" y="1536061"/>
             <a:chExt cx="520117" cy="501242"/>
@@ -18794,7 +18802,7 @@
         </p:nvGrpSpPr>
         <p:grpSpPr>
           <a:xfrm>
-            <a:off x="5835941" y="3178379"/>
+            <a:off x="5717407" y="3130372"/>
             <a:ext cx="520117" cy="501242"/>
             <a:chOff x="5835941" y="3178379"/>
             <a:chExt cx="520117" cy="501242"/>
@@ -18910,7 +18918,7 @@
         </p:nvGrpSpPr>
         <p:grpSpPr>
           <a:xfrm>
-            <a:off x="4630405" y="5097930"/>
+            <a:off x="6254991" y="4627823"/>
             <a:ext cx="520117" cy="501242"/>
             <a:chOff x="4630405" y="5097930"/>
             <a:chExt cx="520117" cy="501242"/>
@@ -19084,6 +19092,55 @@
           </a:prstGeom>
         </p:spPr>
       </p:pic>
+      <p:sp>
+        <p:nvSpPr>
+          <p:cNvPr id="2" name="ZoneTexte 1">
+            <a:extLst>
+              <a:ext uri="{FF2B5EF4-FFF2-40B4-BE49-F238E27FC236}">
+                <a16:creationId xmlns:a16="http://schemas.microsoft.com/office/drawing/2014/main" id="{23CCBC4F-54CC-4722-B249-0861DC0369DA}"/>
+              </a:ext>
+            </a:extLst>
+          </p:cNvPr>
+          <p:cNvSpPr txBox="1"/>
+          <p:nvPr/>
+        </p:nvSpPr>
+        <p:spPr>
+          <a:xfrm>
+            <a:off x="6884324" y="3033290"/>
+            <a:ext cx="1734817" cy="646331"/>
+          </a:xfrm>
+          <a:prstGeom prst="rect">
+            <a:avLst/>
+          </a:prstGeom>
+          <a:noFill/>
+        </p:spPr>
+        <p:txBody>
+          <a:bodyPr wrap="square" rtlCol="0">
+            <a:spAutoFit/>
+          </a:bodyPr>
+          <a:lstStyle/>
+          <a:p>
+            <a:pPr marL="285750" indent="-285750">
+              <a:buFont typeface="Wingdings" panose="05000000000000000000" pitchFamily="2" charset="2"/>
+              <a:buChar char="Ø"/>
+            </a:pPr>
+            <a:r>
+              <a:rPr lang="fr-FR" dirty="0"/>
+              <a:t>Entité</a:t>
+            </a:r>
+          </a:p>
+          <a:p>
+            <a:pPr marL="285750" indent="-285750">
+              <a:buFont typeface="Wingdings" panose="05000000000000000000" pitchFamily="2" charset="2"/>
+              <a:buChar char="Ø"/>
+            </a:pPr>
+            <a:r>
+              <a:rPr lang="fr-FR" dirty="0"/>
+              <a:t>Repository</a:t>
+            </a:r>
+          </a:p>
+        </p:txBody>
+      </p:sp>
     </p:spTree>
     <p:extLst>
       <p:ext uri="{BB962C8B-B14F-4D97-AF65-F5344CB8AC3E}">
@@ -19461,7 +19518,7 @@
           <a:p>
             <a:fld id="{EE75921B-C4F6-4949-BEE6-7B8822AEE9B3}" type="datetime1">
               <a:rPr lang="fr-FR" smtClean="0"/>
-              <a:t>04/06/2020</a:t>
+              <a:t>07/06/2020</a:t>
             </a:fld>
             <a:endParaRPr lang="fr-FR"/>
           </a:p>
@@ -19647,11 +19704,11 @@
           <a:bodyPr/>
           <a:lstStyle/>
           <a:p>
+            <a:pPr algn="ctr"/>
             <a:r>
-              <a:rPr lang="fr-FR"/>
+              <a:rPr lang="fr-FR" dirty="0"/>
               <a:t>MCD</a:t>
             </a:r>
-            <a:endParaRPr lang="fr-FR" dirty="0"/>
           </a:p>
         </p:txBody>
       </p:sp>
@@ -19679,7 +19736,7 @@
             <a:fld id="{EE75921B-C4F6-4949-BEE6-7B8822AEE9B3}" type="datetime1">
               <a:rPr lang="fr-FR" smtClean="0"/>
               <a:pPr/>
-              <a:t>04/06/2020</a:t>
+              <a:t>07/06/2020</a:t>
             </a:fld>
             <a:endParaRPr lang="fr-FR"/>
           </a:p>
@@ -21439,7 +21496,7 @@
                   <a:spcPts val="600"/>
                 </a:spcAft>
               </a:pPr>
-              <a:t>6/4/2020</a:t>
+              <a:t>6/7/2020</a:t>
             </a:fld>
             <a:endParaRPr lang="en-US"/>
           </a:p>
@@ -22091,7 +22148,7 @@
                   <a:spcPts val="600"/>
                 </a:spcAft>
               </a:pPr>
-              <a:t>6/4/2020</a:t>
+              <a:t>6/7/2020</a:t>
             </a:fld>
             <a:endParaRPr lang="en-US"/>
           </a:p>
@@ -22383,13 +22440,18 @@
           <a:lstStyle/>
           <a:p>
             <a:r>
-              <a:rPr lang="fr-FR" sz="3600">
+              <a:rPr lang="fr-FR" sz="3600" dirty="0" err="1">
                 <a:solidFill>
                   <a:srgbClr val="FFFFFF"/>
                 </a:solidFill>
               </a:rPr>
-              <a:t>Requête</a:t>
+              <a:t>Request</a:t>
             </a:r>
+            <a:endParaRPr lang="fr-FR" sz="3600" dirty="0">
+              <a:solidFill>
+                <a:srgbClr val="FFFFFF"/>
+              </a:solidFill>
+            </a:endParaRPr>
           </a:p>
         </p:txBody>
       </p:sp>
@@ -22464,7 +22526,7 @@
             <p:ph idx="1"/>
             <p:extLst>
               <p:ext uri="{D42A27DB-BD31-4B8C-83A1-F6EECF244321}">
-                <p14:modId xmlns:p14="http://schemas.microsoft.com/office/powerpoint/2010/main" val="3738912555"/>
+                <p14:modId xmlns:p14="http://schemas.microsoft.com/office/powerpoint/2010/main" val="3797433353"/>
               </p:ext>
             </p:extLst>
           </p:nvPr>
@@ -22519,7 +22581,7 @@
                   <a:spcPts val="600"/>
                 </a:spcAft>
               </a:pPr>
-              <a:t>04/06/2020</a:t>
+              <a:t>07/06/2020</a:t>
             </a:fld>
             <a:endParaRPr lang="fr-FR"/>
           </a:p>
@@ -22952,7 +23014,7 @@
             <p:ph idx="1"/>
             <p:extLst>
               <p:ext uri="{D42A27DB-BD31-4B8C-83A1-F6EECF244321}">
-                <p14:modId xmlns:p14="http://schemas.microsoft.com/office/powerpoint/2010/main" val="1158038731"/>
+                <p14:modId xmlns:p14="http://schemas.microsoft.com/office/powerpoint/2010/main" val="715809293"/>
               </p:ext>
             </p:extLst>
           </p:nvPr>
@@ -23007,7 +23069,7 @@
                   <a:spcPts val="600"/>
                 </a:spcAft>
               </a:pPr>
-              <a:t>04/06/2020</a:t>
+              <a:t>07/06/2020</a:t>
             </a:fld>
             <a:endParaRPr lang="fr-FR"/>
           </a:p>
@@ -23217,7 +23279,7 @@
                 <a:tabLst/>
                 <a:defRPr/>
               </a:pPr>
-              <a:t>04/06/2020</a:t>
+              <a:t>07/06/2020</a:t>
             </a:fld>
             <a:endParaRPr kumimoji="0" lang="fr-FR" b="0" i="0" u="none" strike="noStrike" kern="1200" cap="none" spc="0" normalizeH="0" baseline="0" noProof="0">
               <a:ln>
@@ -24053,7 +24115,7 @@
                   <a:spcPts val="600"/>
                 </a:spcAft>
               </a:pPr>
-              <a:t>04/06/2020</a:t>
+              <a:t>07/06/2020</a:t>
             </a:fld>
             <a:endParaRPr lang="fr-FR"/>
           </a:p>
@@ -24422,7 +24484,7 @@
                 <a:tabLst/>
                 <a:defRPr/>
               </a:pPr>
-              <a:t>04/06/2020</a:t>
+              <a:t>07/06/2020</a:t>
             </a:fld>
             <a:endParaRPr kumimoji="0" lang="fr-FR" b="0" i="0" u="none" strike="noStrike" kern="1200" cap="none" spc="0" normalizeH="0" baseline="0" noProof="0">
               <a:ln>
@@ -25263,7 +25325,7 @@
                   <a:spcPts val="600"/>
                 </a:spcAft>
               </a:pPr>
-              <a:t>04/06/2020</a:t>
+              <a:t>07/06/2020</a:t>
             </a:fld>
             <a:endParaRPr lang="fr-FR"/>
           </a:p>
@@ -25492,7 +25554,7 @@
               </a:pPr>
               <a:r>
                 <a:rPr lang="fr-FR" sz="2800" dirty="0"/>
-                <a:t>La Vue, géré par </a:t>
+                <a:t>La Vue, gérée par </a:t>
               </a:r>
               <a:r>
                 <a:rPr lang="fr-FR" sz="2800" dirty="0" err="1"/>
@@ -25500,15 +25562,7 @@
               </a:r>
               <a:r>
                 <a:rPr lang="fr-FR" sz="2800" dirty="0"/>
-                <a:t>, </a:t>
-              </a:r>
-              <a:r>
-                <a:rPr lang="fr-FR" sz="2800"/>
-                <a:t>permet d’organiser, </a:t>
-              </a:r>
-              <a:r>
-                <a:rPr lang="fr-FR" sz="2800" dirty="0"/>
-                <a:t>de conditionner le rendue de la page HTML que nous allons ensuite renvoyé à l’utilisateur.</a:t>
+                <a:t>, permet d’organiser, de conditionner le rendu de la page HTML que nous allons ensuite renvoyer à l’utilisateur.</a:t>
               </a:r>
             </a:p>
           </p:txBody>
@@ -25567,7 +25621,7 @@
           <a:p>
             <a:fld id="{17B14172-D5F5-4BFB-89B6-FE98C0A91CE9}" type="datetime1">
               <a:rPr lang="fr-FR" smtClean="0"/>
-              <a:t>04/06/2020</a:t>
+              <a:t>07/06/2020</a:t>
             </a:fld>
             <a:endParaRPr lang="fr-FR"/>
           </a:p>
@@ -27618,7 +27672,7 @@
                   <a:spcPts val="600"/>
                 </a:spcAft>
               </a:pPr>
-              <a:t>04/06/2020</a:t>
+              <a:t>07/06/2020</a:t>
             </a:fld>
             <a:endParaRPr lang="fr-FR"/>
           </a:p>
@@ -28431,7 +28485,7 @@
                   <a:spcPts val="600"/>
                 </a:spcAft>
               </a:pPr>
-              <a:t>6/4/2020</a:t>
+              <a:t>6/7/2020</a:t>
             </a:fld>
             <a:endParaRPr lang="en-US"/>
           </a:p>
@@ -28544,7 +28598,7 @@
         </p:nvSpPr>
         <p:spPr>
           <a:xfrm>
-            <a:off x="4306721" y="5364673"/>
+            <a:off x="4306721" y="5291566"/>
             <a:ext cx="3575412" cy="738664"/>
           </a:xfrm>
           <a:prstGeom prst="rect">
@@ -28558,11 +28612,12 @@
           </a:bodyPr>
           <a:lstStyle/>
           <a:p>
+            <a:pPr algn="ctr"/>
             <a:r>
               <a:rPr lang="en-US" sz="2400" dirty="0">
                 <a:hlinkClick r:id="rId2"/>
               </a:rPr>
-              <a:t>www.tofbox.sylvainallain.fr</a:t>
+              <a:t>tofbox.sylvainallain.fr</a:t>
             </a:r>
             <a:endParaRPr lang="en-US" sz="2400" dirty="0"/>
           </a:p>
@@ -29081,7 +29136,7 @@
                   <a:spcPts val="600"/>
                 </a:spcAft>
               </a:pPr>
-              <a:t>6/4/2020</a:t>
+              <a:t>6/7/2020</a:t>
             </a:fld>
             <a:endParaRPr lang="en-US"/>
           </a:p>
@@ -29506,7 +29561,7 @@
                   <a:spcPts val="600"/>
                 </a:spcAft>
               </a:pPr>
-              <a:t>04/06/2020</a:t>
+              <a:t>07/06/2020</a:t>
             </a:fld>
             <a:endParaRPr lang="fr-FR"/>
           </a:p>
@@ -29626,7 +29681,7 @@
             <p:ph idx="1"/>
             <p:extLst>
               <p:ext uri="{D42A27DB-BD31-4B8C-83A1-F6EECF244321}">
-                <p14:modId xmlns:p14="http://schemas.microsoft.com/office/powerpoint/2010/main" val="366841446"/>
+                <p14:modId xmlns:p14="http://schemas.microsoft.com/office/powerpoint/2010/main" val="1531640933"/>
               </p:ext>
             </p:extLst>
           </p:nvPr>
@@ -29694,7 +29749,7 @@
           <a:p>
             <a:fld id="{17B14172-D5F5-4BFB-89B6-FE98C0A91CE9}" type="datetime1">
               <a:rPr lang="fr-FR" smtClean="0"/>
-              <a:t>04/06/2020</a:t>
+              <a:t>07/06/2020</a:t>
             </a:fld>
             <a:endParaRPr lang="fr-FR"/>
           </a:p>
@@ -29807,7 +29862,7 @@
             <p:ph idx="4294967295"/>
             <p:extLst>
               <p:ext uri="{D42A27DB-BD31-4B8C-83A1-F6EECF244321}">
-                <p14:modId xmlns:p14="http://schemas.microsoft.com/office/powerpoint/2010/main" val="1598238921"/>
+                <p14:modId xmlns:p14="http://schemas.microsoft.com/office/powerpoint/2010/main" val="409866499"/>
               </p:ext>
             </p:extLst>
           </p:nvPr>
@@ -29856,7 +29911,7 @@
             </a:pPr>
             <a:r>
               <a:rPr lang="fr-FR" b="1" dirty="0"/>
-              <a:t>Anonyme</a:t>
+              <a:t>Non connecté</a:t>
             </a:r>
           </a:p>
           <a:p>
@@ -30006,7 +30061,7 @@
             </a:pPr>
             <a:r>
               <a:rPr lang="fr-FR" sz="1600" dirty="0"/>
-              <a:t>A accès a toutes les fonctionnalités d’un utilisateur connecté. Sauf changement d’adresse e-mail et mot de passe</a:t>
+              <a:t>A accès à toutes les fonctionnalités d’un utilisateur connecté. Sauf changement d’adresse e-mail et mot de passe</a:t>
             </a:r>
             <a:endParaRPr lang="fr-FR" sz="1600" b="1" dirty="0"/>
           </a:p>
@@ -30017,7 +30072,7 @@
             </a:pPr>
             <a:r>
               <a:rPr lang="fr-FR" sz="1600" dirty="0"/>
-              <a:t>Accès a un espace d’administration</a:t>
+              <a:t>Accès à un espace d’administration</a:t>
             </a:r>
           </a:p>
         </p:txBody>
@@ -31193,7 +31248,7 @@
             </a:pPr>
             <a:r>
               <a:rPr lang="fr-FR" dirty="0"/>
-              <a:t> Outils lié au développement</a:t>
+              <a:t> Outils liés au développement</a:t>
             </a:r>
           </a:p>
         </p:txBody>
@@ -31221,7 +31276,7 @@
           <a:p>
             <a:fld id="{17B14172-D5F5-4BFB-89B6-FE98C0A91CE9}" type="datetime1">
               <a:rPr lang="fr-FR" smtClean="0"/>
-              <a:t>04/06/2020</a:t>
+              <a:t>07/06/2020</a:t>
             </a:fld>
             <a:endParaRPr lang="fr-FR"/>
           </a:p>
@@ -32570,7 +32625,7 @@
             <a:pPr algn="ctr"/>
             <a:r>
               <a:rPr lang="fr-FR" dirty="0"/>
-              <a:t>Langages, bibliothèque et environnement de développement</a:t>
+              <a:t>Langages, bibliothèques et environnement de développement</a:t>
             </a:r>
           </a:p>
         </p:txBody>
@@ -32675,7 +32730,7 @@
           <a:p>
             <a:fld id="{17B14172-D5F5-4BFB-89B6-FE98C0A91CE9}" type="datetime1">
               <a:rPr lang="fr-FR" smtClean="0"/>
-              <a:t>04/06/2020</a:t>
+              <a:t>07/06/2020</a:t>
             </a:fld>
             <a:endParaRPr lang="fr-FR"/>
           </a:p>
@@ -34654,7 +34709,7 @@
                   <a:spcPts val="600"/>
                 </a:spcAft>
               </a:pPr>
-              <a:t>6/4/2020</a:t>
+              <a:t>6/7/2020</a:t>
             </a:fld>
             <a:endParaRPr lang="en-US"/>
           </a:p>
@@ -35301,7 +35356,7 @@
                   <a:spcPts val="600"/>
                 </a:spcAft>
               </a:pPr>
-              <a:t>6/4/2020</a:t>
+              <a:t>6/7/2020</a:t>
             </a:fld>
             <a:endParaRPr lang="en-US"/>
           </a:p>
@@ -35948,7 +36003,7 @@
                   <a:spcPts val="600"/>
                 </a:spcAft>
               </a:pPr>
-              <a:t>6/4/2020</a:t>
+              <a:t>6/7/2020</a:t>
             </a:fld>
             <a:endParaRPr lang="en-US"/>
           </a:p>

</xml_diff>

<commit_message>
Dossier finaux, PPT final
</commit_message>
<xml_diff>
--- a/ProjetTof’Box.pptx
+++ b/ProjetTof’Box.pptx
@@ -5,10 +5,10 @@
     <p:sldMasterId id="2147484363" r:id="rId1"/>
   </p:sldMasterIdLst>
   <p:notesMasterIdLst>
-    <p:notesMasterId r:id="rId31"/>
+    <p:notesMasterId r:id="rId32"/>
   </p:notesMasterIdLst>
   <p:handoutMasterIdLst>
-    <p:handoutMasterId r:id="rId32"/>
+    <p:handoutMasterId r:id="rId33"/>
   </p:handoutMasterIdLst>
   <p:sldIdLst>
     <p:sldId id="256" r:id="rId2"/>
@@ -39,7 +39,8 @@
     <p:sldId id="289" r:id="rId27"/>
     <p:sldId id="291" r:id="rId28"/>
     <p:sldId id="270" r:id="rId29"/>
-    <p:sldId id="271" r:id="rId30"/>
+    <p:sldId id="292" r:id="rId30"/>
+    <p:sldId id="271" r:id="rId31"/>
   </p:sldIdLst>
   <p:sldSz cx="12192000" cy="6858000"/>
   <p:notesSz cx="6858000" cy="9144000"/>
@@ -191,6 +192,7 @@
         <p14:section name="Demo" id="{790AA0AA-23A4-4B3D-AD20-F1806A8B0D6A}">
           <p14:sldIdLst>
             <p14:sldId id="270"/>
+            <p14:sldId id="292"/>
             <p14:sldId id="271"/>
           </p14:sldIdLst>
         </p14:section>
@@ -10672,7 +10674,7 @@
           <a:p>
             <a:fld id="{A92484F3-E9B1-4147-BA48-FC09D99FF563}" type="datetimeFigureOut">
               <a:rPr lang="fr-FR" smtClean="0"/>
-              <a:t>08/06/2020</a:t>
+              <a:t>23/06/2020</a:t>
             </a:fld>
             <a:endParaRPr lang="fr-FR"/>
           </a:p>
@@ -10850,7 +10852,7 @@
           <a:p>
             <a:fld id="{04B58477-CB09-4F23-A236-9E87FF4CBDB9}" type="datetimeFigureOut">
               <a:rPr lang="fr-FR" smtClean="0"/>
-              <a:t>08/06/2020</a:t>
+              <a:t>23/06/2020</a:t>
             </a:fld>
             <a:endParaRPr lang="fr-FR"/>
           </a:p>
@@ -11461,6 +11463,212 @@
 </p:notes>
 </file>
 
+<file path=ppt/notesSlides/notesSlide4.xml><?xml version="1.0" encoding="utf-8"?>
+<p:notes xmlns:a="http://schemas.openxmlformats.org/drawingml/2006/main" xmlns:r="http://schemas.openxmlformats.org/officeDocument/2006/relationships" xmlns:p="http://schemas.openxmlformats.org/presentationml/2006/main">
+  <p:cSld>
+    <p:spTree>
+      <p:nvGrpSpPr>
+        <p:cNvPr id="1" name=""/>
+        <p:cNvGrpSpPr/>
+        <p:nvPr/>
+      </p:nvGrpSpPr>
+      <p:grpSpPr>
+        <a:xfrm>
+          <a:off x="0" y="0"/>
+          <a:ext cx="0" cy="0"/>
+          <a:chOff x="0" y="0"/>
+          <a:chExt cx="0" cy="0"/>
+        </a:xfrm>
+      </p:grpSpPr>
+      <p:sp>
+        <p:nvSpPr>
+          <p:cNvPr id="2" name="Espace réservé de l'image des diapositives 1"/>
+          <p:cNvSpPr>
+            <a:spLocks noGrp="1" noRot="1" noChangeAspect="1"/>
+          </p:cNvSpPr>
+          <p:nvPr>
+            <p:ph type="sldImg"/>
+          </p:nvPr>
+        </p:nvSpPr>
+        <p:spPr/>
+      </p:sp>
+      <p:sp>
+        <p:nvSpPr>
+          <p:cNvPr id="3" name="Espace réservé des notes 2"/>
+          <p:cNvSpPr>
+            <a:spLocks noGrp="1"/>
+          </p:cNvSpPr>
+          <p:nvPr>
+            <p:ph type="body" idx="1"/>
+          </p:nvPr>
+        </p:nvSpPr>
+        <p:spPr/>
+        <p:txBody>
+          <a:bodyPr/>
+          <a:lstStyle/>
+          <a:p>
+            <a:endParaRPr lang="fr-FR" dirty="0"/>
+          </a:p>
+        </p:txBody>
+      </p:sp>
+      <p:sp>
+        <p:nvSpPr>
+          <p:cNvPr id="4" name="Espace réservé du pied de page 3"/>
+          <p:cNvSpPr>
+            <a:spLocks noGrp="1"/>
+          </p:cNvSpPr>
+          <p:nvPr>
+            <p:ph type="ftr" sz="quarter" idx="4"/>
+          </p:nvPr>
+        </p:nvSpPr>
+        <p:spPr/>
+        <p:txBody>
+          <a:bodyPr/>
+          <a:lstStyle/>
+          <a:p>
+            <a:endParaRPr lang="fr-FR"/>
+          </a:p>
+        </p:txBody>
+      </p:sp>
+      <p:sp>
+        <p:nvSpPr>
+          <p:cNvPr id="5" name="Espace réservé du numéro de diapositive 4"/>
+          <p:cNvSpPr>
+            <a:spLocks noGrp="1"/>
+          </p:cNvSpPr>
+          <p:nvPr>
+            <p:ph type="sldNum" sz="quarter" idx="5"/>
+          </p:nvPr>
+        </p:nvSpPr>
+        <p:spPr/>
+        <p:txBody>
+          <a:bodyPr/>
+          <a:lstStyle/>
+          <a:p>
+            <a:fld id="{29CE9D0A-0D4D-4103-A069-496353309B8D}" type="slidenum">
+              <a:rPr lang="fr-FR" smtClean="0"/>
+              <a:t>18</a:t>
+            </a:fld>
+            <a:endParaRPr lang="fr-FR"/>
+          </a:p>
+        </p:txBody>
+      </p:sp>
+    </p:spTree>
+    <p:extLst>
+      <p:ext uri="{BB962C8B-B14F-4D97-AF65-F5344CB8AC3E}">
+        <p14:creationId xmlns:p14="http://schemas.microsoft.com/office/powerpoint/2010/main" val="1591417627"/>
+      </p:ext>
+    </p:extLst>
+  </p:cSld>
+  <p:clrMapOvr>
+    <a:masterClrMapping/>
+  </p:clrMapOvr>
+</p:notes>
+</file>
+
+<file path=ppt/notesSlides/notesSlide5.xml><?xml version="1.0" encoding="utf-8"?>
+<p:notes xmlns:a="http://schemas.openxmlformats.org/drawingml/2006/main" xmlns:r="http://schemas.openxmlformats.org/officeDocument/2006/relationships" xmlns:p="http://schemas.openxmlformats.org/presentationml/2006/main">
+  <p:cSld>
+    <p:spTree>
+      <p:nvGrpSpPr>
+        <p:cNvPr id="1" name=""/>
+        <p:cNvGrpSpPr/>
+        <p:nvPr/>
+      </p:nvGrpSpPr>
+      <p:grpSpPr>
+        <a:xfrm>
+          <a:off x="0" y="0"/>
+          <a:ext cx="0" cy="0"/>
+          <a:chOff x="0" y="0"/>
+          <a:chExt cx="0" cy="0"/>
+        </a:xfrm>
+      </p:grpSpPr>
+      <p:sp>
+        <p:nvSpPr>
+          <p:cNvPr id="2" name="Espace réservé de l'image des diapositives 1"/>
+          <p:cNvSpPr>
+            <a:spLocks noGrp="1" noRot="1" noChangeAspect="1"/>
+          </p:cNvSpPr>
+          <p:nvPr>
+            <p:ph type="sldImg"/>
+          </p:nvPr>
+        </p:nvSpPr>
+        <p:spPr/>
+      </p:sp>
+      <p:sp>
+        <p:nvSpPr>
+          <p:cNvPr id="3" name="Espace réservé des notes 2"/>
+          <p:cNvSpPr>
+            <a:spLocks noGrp="1"/>
+          </p:cNvSpPr>
+          <p:nvPr>
+            <p:ph type="body" idx="1"/>
+          </p:nvPr>
+        </p:nvSpPr>
+        <p:spPr/>
+        <p:txBody>
+          <a:bodyPr/>
+          <a:lstStyle/>
+          <a:p>
+            <a:endParaRPr lang="fr-FR" dirty="0"/>
+          </a:p>
+        </p:txBody>
+      </p:sp>
+      <p:sp>
+        <p:nvSpPr>
+          <p:cNvPr id="4" name="Espace réservé du pied de page 3"/>
+          <p:cNvSpPr>
+            <a:spLocks noGrp="1"/>
+          </p:cNvSpPr>
+          <p:nvPr>
+            <p:ph type="ftr" sz="quarter" idx="4"/>
+          </p:nvPr>
+        </p:nvSpPr>
+        <p:spPr/>
+        <p:txBody>
+          <a:bodyPr/>
+          <a:lstStyle/>
+          <a:p>
+            <a:endParaRPr lang="fr-FR"/>
+          </a:p>
+        </p:txBody>
+      </p:sp>
+      <p:sp>
+        <p:nvSpPr>
+          <p:cNvPr id="5" name="Espace réservé du numéro de diapositive 4"/>
+          <p:cNvSpPr>
+            <a:spLocks noGrp="1"/>
+          </p:cNvSpPr>
+          <p:nvPr>
+            <p:ph type="sldNum" sz="quarter" idx="5"/>
+          </p:nvPr>
+        </p:nvSpPr>
+        <p:spPr/>
+        <p:txBody>
+          <a:bodyPr/>
+          <a:lstStyle/>
+          <a:p>
+            <a:fld id="{29CE9D0A-0D4D-4103-A069-496353309B8D}" type="slidenum">
+              <a:rPr lang="fr-FR" smtClean="0"/>
+              <a:t>29</a:t>
+            </a:fld>
+            <a:endParaRPr lang="fr-FR"/>
+          </a:p>
+        </p:txBody>
+      </p:sp>
+    </p:spTree>
+    <p:extLst>
+      <p:ext uri="{BB962C8B-B14F-4D97-AF65-F5344CB8AC3E}">
+        <p14:creationId xmlns:p14="http://schemas.microsoft.com/office/powerpoint/2010/main" val="1499277149"/>
+      </p:ext>
+    </p:extLst>
+  </p:cSld>
+  <p:clrMapOvr>
+    <a:masterClrMapping/>
+  </p:clrMapOvr>
+</p:notes>
+</file>
+
 <file path=ppt/slideLayouts/slideLayout1.xml><?xml version="1.0" encoding="utf-8"?>
 <p:sldLayout xmlns:a="http://schemas.openxmlformats.org/drawingml/2006/main" xmlns:r="http://schemas.openxmlformats.org/officeDocument/2006/relationships" xmlns:p="http://schemas.openxmlformats.org/presentationml/2006/main" showMasterSp="0" type="title" preserve="1">
   <p:cSld name="Diapositive de titre">
@@ -11685,9 +11893,9 @@
           <a:bodyPr/>
           <a:lstStyle/>
           <a:p>
-            <a:fld id="{09181184-F05B-400A-8A17-582BFB35CEC7}" type="datetime1">
+            <a:fld id="{388EE2C5-1EF5-4EBC-8C38-16E15A9CDDEF}" type="datetime1">
               <a:rPr lang="fr-FR" smtClean="0"/>
-              <a:t>08/06/2020</a:t>
+              <a:t>23/06/2020</a:t>
             </a:fld>
             <a:endParaRPr lang="fr-FR"/>
           </a:p>
@@ -11896,9 +12104,9 @@
           <a:bodyPr/>
           <a:lstStyle/>
           <a:p>
-            <a:fld id="{17B14172-D5F5-4BFB-89B6-FE98C0A91CE9}" type="datetime1">
+            <a:fld id="{05468D74-146F-4F9E-A1D1-041085B348A0}" type="datetime1">
               <a:rPr lang="fr-FR" smtClean="0"/>
-              <a:t>08/06/2020</a:t>
+              <a:t>23/06/2020</a:t>
             </a:fld>
             <a:endParaRPr lang="fr-FR"/>
           </a:p>
@@ -11959,7 +12167,6 @@
   <p:clrMapOvr>
     <a:masterClrMapping/>
   </p:clrMapOvr>
-  <p:hf hdr="0"/>
 </p:sldLayout>
 </file>
 
@@ -12156,9 +12363,9 @@
           <a:bodyPr/>
           <a:lstStyle/>
           <a:p>
-            <a:fld id="{17B14172-D5F5-4BFB-89B6-FE98C0A91CE9}" type="datetime1">
+            <a:fld id="{566828A3-961A-4499-BD64-169511DFDB1F}" type="datetime1">
               <a:rPr lang="fr-FR" smtClean="0"/>
-              <a:t>08/06/2020</a:t>
+              <a:t>23/06/2020</a:t>
             </a:fld>
             <a:endParaRPr lang="fr-FR"/>
           </a:p>
@@ -12219,7 +12426,6 @@
   <p:clrMapOvr>
     <a:masterClrMapping/>
   </p:clrMapOvr>
-  <p:hf hdr="0"/>
 </p:sldLayout>
 </file>
 
@@ -12330,9 +12536,9 @@
           <a:bodyPr/>
           <a:lstStyle/>
           <a:p>
-            <a:fld id="{17B14172-D5F5-4BFB-89B6-FE98C0A91CE9}" type="datetime1">
+            <a:fld id="{63B7A2F3-D835-4684-A8DA-04E498BA7677}" type="datetime1">
               <a:rPr lang="fr-FR" smtClean="0"/>
-              <a:t>08/06/2020</a:t>
+              <a:t>23/06/2020</a:t>
             </a:fld>
             <a:endParaRPr lang="fr-FR"/>
           </a:p>
@@ -12393,7 +12599,6 @@
   <p:clrMapOvr>
     <a:masterClrMapping/>
   </p:clrMapOvr>
-  <p:hf hdr="0"/>
 </p:sldLayout>
 </file>
 
@@ -12677,9 +12882,9 @@
           <a:bodyPr/>
           <a:lstStyle/>
           <a:p>
-            <a:fld id="{EE75921B-C4F6-4949-BEE6-7B8822AEE9B3}" type="datetime1">
+            <a:fld id="{8DDC2EB0-ABEC-4627-BE38-1A2EC77B0923}" type="datetime1">
               <a:rPr lang="fr-FR" smtClean="0"/>
-              <a:t>08/06/2020</a:t>
+              <a:t>23/06/2020</a:t>
             </a:fld>
             <a:endParaRPr lang="fr-FR"/>
           </a:p>
@@ -12955,9 +13160,9 @@
           <a:bodyPr/>
           <a:lstStyle/>
           <a:p>
-            <a:fld id="{17B14172-D5F5-4BFB-89B6-FE98C0A91CE9}" type="datetime1">
+            <a:fld id="{43A7CB89-7AD0-4CF7-9612-F4AF81211C98}" type="datetime1">
               <a:rPr lang="fr-FR" smtClean="0"/>
-              <a:t>08/06/2020</a:t>
+              <a:t>23/06/2020</a:t>
             </a:fld>
             <a:endParaRPr lang="fr-FR"/>
           </a:p>
@@ -13018,7 +13223,6 @@
   <p:clrMapOvr>
     <a:masterClrMapping/>
   </p:clrMapOvr>
-  <p:hf hdr="0"/>
 </p:sldLayout>
 </file>
 
@@ -13338,9 +13542,9 @@
           <a:bodyPr/>
           <a:lstStyle/>
           <a:p>
-            <a:fld id="{17B14172-D5F5-4BFB-89B6-FE98C0A91CE9}" type="datetime1">
+            <a:fld id="{4374ED64-87F2-4F7F-884B-124C4D752064}" type="datetime1">
               <a:rPr lang="fr-FR" smtClean="0"/>
-              <a:t>08/06/2020</a:t>
+              <a:t>23/06/2020</a:t>
             </a:fld>
             <a:endParaRPr lang="fr-FR"/>
           </a:p>
@@ -13401,7 +13605,6 @@
   <p:clrMapOvr>
     <a:masterClrMapping/>
   </p:clrMapOvr>
-  <p:hf hdr="0"/>
 </p:sldLayout>
 </file>
 
@@ -13460,9 +13663,9 @@
           <a:bodyPr/>
           <a:lstStyle/>
           <a:p>
-            <a:fld id="{919D7D2C-C368-49AA-ABB9-59757E9049E2}" type="datetime1">
+            <a:fld id="{18DDD514-7373-42F0-96D8-10E04C6FFDDE}" type="datetime1">
               <a:rPr lang="fr-FR" smtClean="0"/>
-              <a:t>08/06/2020</a:t>
+              <a:t>23/06/2020</a:t>
             </a:fld>
             <a:endParaRPr lang="fr-FR"/>
           </a:p>
@@ -13634,9 +13837,9 @@
           <a:bodyPr/>
           <a:lstStyle/>
           <a:p>
-            <a:fld id="{772202B7-1C66-4DE8-B9AF-37C9BE30BA80}" type="datetime1">
+            <a:fld id="{0D0E1293-22E0-486A-A697-F308DFD1CBC8}" type="datetime1">
               <a:rPr lang="fr-FR" smtClean="0"/>
-              <a:t>08/06/2020</a:t>
+              <a:t>23/06/2020</a:t>
             </a:fld>
             <a:endParaRPr lang="fr-FR"/>
           </a:p>
@@ -13991,9 +14194,9 @@
             </a:lvl1pPr>
           </a:lstStyle>
           <a:p>
-            <a:fld id="{17B14172-D5F5-4BFB-89B6-FE98C0A91CE9}" type="datetime1">
+            <a:fld id="{8B405442-5C07-4167-AD29-DF1A83DE44AE}" type="datetime1">
               <a:rPr lang="fr-FR" smtClean="0"/>
-              <a:t>08/06/2020</a:t>
+              <a:t>23/06/2020</a:t>
             </a:fld>
             <a:endParaRPr lang="fr-FR"/>
           </a:p>
@@ -14075,7 +14278,6 @@
   <p:clrMapOvr>
     <a:masterClrMapping/>
   </p:clrMapOvr>
-  <p:hf hdr="0"/>
 </p:sldLayout>
 </file>
 
@@ -14372,9 +14574,9 @@
           <a:bodyPr/>
           <a:lstStyle/>
           <a:p>
-            <a:fld id="{14BC84F3-64A9-4428-BDB0-8FB8732EE96B}" type="datetime1">
+            <a:fld id="{D70A3316-EBD9-45AF-A3D9-D5B111736D12}" type="datetime1">
               <a:rPr lang="fr-FR" smtClean="0"/>
-              <a:t>08/06/2020</a:t>
+              <a:t>23/06/2020</a:t>
             </a:fld>
             <a:endParaRPr lang="fr-FR"/>
           </a:p>
@@ -14662,9 +14864,9 @@
             </a:lvl1pPr>
           </a:lstStyle>
           <a:p>
-            <a:fld id="{17B14172-D5F5-4BFB-89B6-FE98C0A91CE9}" type="datetime1">
+            <a:fld id="{CBD41637-5BB7-4881-92C8-7B471F99E0DB}" type="datetime1">
               <a:rPr lang="fr-FR" smtClean="0"/>
-              <a:t>08/06/2020</a:t>
+              <a:t>23/06/2020</a:t>
             </a:fld>
             <a:endParaRPr lang="fr-FR"/>
           </a:p>
@@ -15549,14 +15751,9 @@
                 <a:spcPts val="600"/>
               </a:spcAft>
             </a:pPr>
-            <a:fld id="{FA6C362E-E33C-4E8F-B180-2B873F5382AB}" type="datetime1">
+            <a:fld id="{B7CE3B96-46F1-42D6-9CAB-8FFB4CEC0F22}" type="datetime1">
               <a:rPr lang="fr-FR" smtClean="0"/>
-              <a:pPr>
-                <a:spcAft>
-                  <a:spcPts val="600"/>
-                </a:spcAft>
-              </a:pPr>
-              <a:t>08/06/2020</a:t>
+              <a:t>23/06/2020</a:t>
             </a:fld>
             <a:endParaRPr lang="fr-FR"/>
           </a:p>
@@ -16215,14 +16412,9 @@
                 <a:spcPts val="600"/>
               </a:spcAft>
             </a:pPr>
-            <a:fld id="{17B14172-D5F5-4BFB-89B6-FE98C0A91CE9}" type="datetime1">
-              <a:rPr lang="en-US" smtClean="0"/>
-              <a:pPr>
-                <a:spcAft>
-                  <a:spcPts val="600"/>
-                </a:spcAft>
-              </a:pPr>
-              <a:t>6/8/2020</a:t>
+            <a:fld id="{CCEA16CD-599E-45B0-9329-081EDBCF8323}" type="datetime1">
+              <a:rPr lang="fr-FR" smtClean="0"/>
+              <a:t>23/06/2020</a:t>
             </a:fld>
             <a:endParaRPr lang="en-US"/>
           </a:p>
@@ -16794,14 +16986,9 @@
                 <a:spcPts val="600"/>
               </a:spcAft>
             </a:pPr>
-            <a:fld id="{EE75921B-C4F6-4949-BEE6-7B8822AEE9B3}" type="datetime1">
-              <a:rPr lang="en-US" smtClean="0"/>
-              <a:pPr>
-                <a:spcAft>
-                  <a:spcPts val="600"/>
-                </a:spcAft>
-              </a:pPr>
-              <a:t>6/8/2020</a:t>
+            <a:fld id="{E1909503-4D26-4C68-A0F1-56589D2D8982}" type="datetime1">
+              <a:rPr lang="fr-FR" smtClean="0"/>
+              <a:t>23/06/2020</a:t>
             </a:fld>
             <a:endParaRPr lang="en-US"/>
           </a:p>
@@ -17044,9 +17231,9 @@
           <a:bodyPr/>
           <a:lstStyle/>
           <a:p>
-            <a:fld id="{17B14172-D5F5-4BFB-89B6-FE98C0A91CE9}" type="datetime1">
+            <a:fld id="{63B75C4A-4464-4517-8619-69F42A06A740}" type="datetime1">
               <a:rPr lang="fr-FR" smtClean="0"/>
-              <a:t>08/06/2020</a:t>
+              <a:t>23/06/2020</a:t>
             </a:fld>
             <a:endParaRPr lang="fr-FR"/>
           </a:p>
@@ -17245,9 +17432,9 @@
           <a:bodyPr/>
           <a:lstStyle/>
           <a:p>
-            <a:fld id="{17B14172-D5F5-4BFB-89B6-FE98C0A91CE9}" type="datetime1">
+            <a:fld id="{608D7940-FA54-4D4F-8B6C-83BEE8F6EFED}" type="datetime1">
               <a:rPr lang="fr-FR" smtClean="0"/>
-              <a:t>08/06/2020</a:t>
+              <a:t>23/06/2020</a:t>
             </a:fld>
             <a:endParaRPr lang="fr-FR"/>
           </a:p>
@@ -17481,9 +17668,9 @@
           <a:bodyPr/>
           <a:lstStyle/>
           <a:p>
-            <a:fld id="{17B14172-D5F5-4BFB-89B6-FE98C0A91CE9}" type="datetime1">
+            <a:fld id="{8BD6FF75-D525-427E-8D15-EC2B54F3345E}" type="datetime1">
               <a:rPr lang="fr-FR" smtClean="0"/>
-              <a:t>08/06/2020</a:t>
+              <a:t>23/06/2020</a:t>
             </a:fld>
             <a:endParaRPr lang="fr-FR"/>
           </a:p>
@@ -18108,14 +18295,9 @@
                 <a:spcPts val="600"/>
               </a:spcAft>
             </a:pPr>
-            <a:fld id="{17B14172-D5F5-4BFB-89B6-FE98C0A91CE9}" type="datetime1">
-              <a:rPr lang="en-US" smtClean="0"/>
-              <a:pPr>
-                <a:spcAft>
-                  <a:spcPts val="600"/>
-                </a:spcAft>
-              </a:pPr>
-              <a:t>6/8/2020</a:t>
+            <a:fld id="{982897A1-D05D-4B7F-A85C-88311E9C06FE}" type="datetime1">
+              <a:rPr lang="fr-FR" smtClean="0"/>
+              <a:t>23/06/2020</a:t>
             </a:fld>
             <a:endParaRPr lang="en-US"/>
           </a:p>
@@ -18265,9 +18447,9 @@
           <a:bodyPr/>
           <a:lstStyle/>
           <a:p>
-            <a:fld id="{EE75921B-C4F6-4949-BEE6-7B8822AEE9B3}" type="datetime1">
+            <a:fld id="{F648853C-1A27-40F6-B79C-1B3E3ED4C064}" type="datetime1">
               <a:rPr lang="fr-FR" smtClean="0"/>
-              <a:t>08/06/2020</a:t>
+              <a:t>23/06/2020</a:t>
             </a:fld>
             <a:endParaRPr lang="fr-FR"/>
           </a:p>
@@ -19508,9 +19690,9 @@
           <a:bodyPr/>
           <a:lstStyle/>
           <a:p>
-            <a:fld id="{EE75921B-C4F6-4949-BEE6-7B8822AEE9B3}" type="datetime1">
+            <a:fld id="{A0B49C85-14EF-4F3F-9C1F-53173D06BF36}" type="datetime1">
               <a:rPr lang="fr-FR" smtClean="0"/>
-              <a:t>08/06/2020</a:t>
+              <a:t>23/06/2020</a:t>
             </a:fld>
             <a:endParaRPr lang="fr-FR"/>
           </a:p>
@@ -19654,7 +19836,7 @@
           <p:nvPr/>
         </p:nvPicPr>
         <p:blipFill>
-          <a:blip r:embed="rId2">
+          <a:blip r:embed="rId3">
             <a:extLst>
               <a:ext uri="{28A0092B-C50C-407E-A947-70E740481C1C}">
                 <a14:useLocalDpi xmlns:a14="http://schemas.microsoft.com/office/drawing/2010/main" val="0"/>
@@ -19725,10 +19907,9 @@
           <a:bodyPr/>
           <a:lstStyle/>
           <a:p>
-            <a:fld id="{EE75921B-C4F6-4949-BEE6-7B8822AEE9B3}" type="datetime1">
+            <a:fld id="{A4EB7FCC-E158-4069-B78E-5FEDC5E78F5E}" type="datetime1">
               <a:rPr lang="fr-FR" smtClean="0"/>
-              <a:pPr/>
-              <a:t>08/06/2020</a:t>
+              <a:t>23/06/2020</a:t>
             </a:fld>
             <a:endParaRPr lang="fr-FR"/>
           </a:p>
@@ -19897,7 +20078,7 @@
             </a:avLst>
           </a:prstGeom>
           <a:solidFill>
-            <a:srgbClr val="FFC000"/>
+            <a:srgbClr val="92D050"/>
           </a:solidFill>
         </p:spPr>
         <p:style>
@@ -21481,14 +21662,9 @@
                 <a:spcPts val="600"/>
               </a:spcAft>
             </a:pPr>
-            <a:fld id="{772202B7-1C66-4DE8-B9AF-37C9BE30BA80}" type="datetime1">
-              <a:rPr lang="en-US" smtClean="0"/>
-              <a:pPr>
-                <a:spcAft>
-                  <a:spcPts val="600"/>
-                </a:spcAft>
-              </a:pPr>
-              <a:t>6/8/2020</a:t>
+            <a:fld id="{958838AE-94D6-47DC-9257-91358474C5F9}" type="datetime1">
+              <a:rPr lang="fr-FR" smtClean="0"/>
+              <a:t>23/06/2020</a:t>
             </a:fld>
             <a:endParaRPr lang="en-US"/>
           </a:p>
@@ -22133,14 +22309,9 @@
                 <a:spcPts val="600"/>
               </a:spcAft>
             </a:pPr>
-            <a:fld id="{1F2B1A4C-2841-4F4E-8F6D-B6FF22F006E0}" type="datetime1">
-              <a:rPr lang="en-US" smtClean="0"/>
-              <a:pPr>
-                <a:spcAft>
-                  <a:spcPts val="600"/>
-                </a:spcAft>
-              </a:pPr>
-              <a:t>6/8/2020</a:t>
+            <a:fld id="{E196F71B-D8F0-4CB6-BF93-5DF5F863AB8E}" type="datetime1">
+              <a:rPr lang="fr-FR" smtClean="0"/>
+              <a:t>23/06/2020</a:t>
             </a:fld>
             <a:endParaRPr lang="en-US"/>
           </a:p>
@@ -22566,14 +22737,9 @@
                 <a:spcPts val="600"/>
               </a:spcAft>
             </a:pPr>
-            <a:fld id="{17B14172-D5F5-4BFB-89B6-FE98C0A91CE9}" type="datetime1">
+            <a:fld id="{70F04ED7-75A1-4412-91E9-08382A689435}" type="datetime1">
               <a:rPr lang="fr-FR" smtClean="0"/>
-              <a:pPr>
-                <a:spcAft>
-                  <a:spcPts val="600"/>
-                </a:spcAft>
-              </a:pPr>
-              <a:t>08/06/2020</a:t>
+              <a:t>23/06/2020</a:t>
             </a:fld>
             <a:endParaRPr lang="fr-FR"/>
           </a:p>
@@ -23054,14 +23220,9 @@
                 <a:spcPts val="600"/>
               </a:spcAft>
             </a:pPr>
-            <a:fld id="{17B14172-D5F5-4BFB-89B6-FE98C0A91CE9}" type="datetime1">
+            <a:fld id="{0F3D448F-6DBB-44A1-8FB7-7835B9908758}" type="datetime1">
               <a:rPr lang="fr-FR" smtClean="0"/>
-              <a:pPr>
-                <a:spcAft>
-                  <a:spcPts val="600"/>
-                </a:spcAft>
-              </a:pPr>
-              <a:t>08/06/2020</a:t>
+              <a:t>23/06/2020</a:t>
             </a:fld>
             <a:endParaRPr lang="fr-FR"/>
           </a:p>
@@ -23245,7 +23406,7 @@
               <a:tabLst/>
               <a:defRPr/>
             </a:pPr>
-            <a:fld id="{17B14172-D5F5-4BFB-89B6-FE98C0A91CE9}" type="datetime1">
+            <a:fld id="{5BFAD8FA-A5C7-4410-89C6-96C8A41E1084}" type="datetime1">
               <a:rPr kumimoji="0" lang="fr-FR" b="0" i="0" u="none" strike="noStrike" kern="1200" cap="none" spc="0" normalizeH="0" baseline="0" noProof="0" smtClean="0">
                 <a:ln>
                   <a:noFill/>
@@ -23257,21 +23418,7 @@
                 <a:ea typeface="+mn-ea"/>
                 <a:cs typeface="+mn-cs"/>
               </a:rPr>
-              <a:pPr marL="0" marR="0" lvl="0" indent="0" defTabSz="457200" rtl="0" eaLnBrk="1" fontAlgn="auto" latinLnBrk="0" hangingPunct="1">
-                <a:spcBef>
-                  <a:spcPts val="0"/>
-                </a:spcBef>
-                <a:spcAft>
-                  <a:spcPts val="600"/>
-                </a:spcAft>
-                <a:buClrTx/>
-                <a:buSzTx/>
-                <a:buFontTx/>
-                <a:buNone/>
-                <a:tabLst/>
-                <a:defRPr/>
-              </a:pPr>
-              <a:t>08/06/2020</a:t>
+              <a:t>23/06/2020</a:t>
             </a:fld>
             <a:endParaRPr kumimoji="0" lang="fr-FR" b="0" i="0" u="none" strike="noStrike" kern="1200" cap="none" spc="0" normalizeH="0" baseline="0" noProof="0">
               <a:ln>
@@ -24100,14 +24247,9 @@
                 <a:spcPts val="600"/>
               </a:spcAft>
             </a:pPr>
-            <a:fld id="{17B14172-D5F5-4BFB-89B6-FE98C0A91CE9}" type="datetime1">
+            <a:fld id="{0AEA5EF3-AADD-4F17-A917-F36ECDC2BD75}" type="datetime1">
               <a:rPr lang="fr-FR" smtClean="0"/>
-              <a:pPr>
-                <a:spcAft>
-                  <a:spcPts val="600"/>
-                </a:spcAft>
-              </a:pPr>
-              <a:t>08/06/2020</a:t>
+              <a:t>23/06/2020</a:t>
             </a:fld>
             <a:endParaRPr lang="fr-FR"/>
           </a:p>
@@ -24289,33 +24431,25 @@
           </p:spPr>
           <p:style>
             <a:lnRef idx="2">
-              <a:schemeClr val="lt1">
-                <a:hueOff val="0"/>
-                <a:satOff val="0"/>
-                <a:lumOff val="0"/>
-                <a:alphaOff val="0"/>
-              </a:schemeClr>
+              <a:schemeClr val="accent2"/>
             </a:lnRef>
             <a:fillRef idx="1">
-              <a:schemeClr val="accent1">
-                <a:hueOff val="0"/>
-                <a:satOff val="0"/>
-                <a:lumOff val="0"/>
-                <a:alphaOff val="0"/>
-              </a:schemeClr>
+              <a:schemeClr val="lt1"/>
             </a:fillRef>
             <a:effectRef idx="0">
-              <a:schemeClr val="accent1">
-                <a:hueOff val="0"/>
-                <a:satOff val="0"/>
-                <a:lumOff val="0"/>
-                <a:alphaOff val="0"/>
-              </a:schemeClr>
+              <a:schemeClr val="accent2"/>
             </a:effectRef>
             <a:fontRef idx="minor">
-              <a:schemeClr val="lt1"/>
+              <a:schemeClr val="dk1"/>
             </a:fontRef>
           </p:style>
+          <p:txBody>
+            <a:bodyPr/>
+            <a:lstStyle/>
+            <a:p>
+              <a:endParaRPr lang="fr-FR" dirty="0"/>
+            </a:p>
+          </p:txBody>
         </p:sp>
         <p:sp>
           <p:nvSpPr>
@@ -24331,7 +24465,7 @@
           </p:nvSpPr>
           <p:spPr>
             <a:xfrm>
-              <a:off x="117442" y="151491"/>
+              <a:off x="234884" y="91081"/>
               <a:ext cx="6178779" cy="2170928"/>
             </a:xfrm>
             <a:prstGeom prst="rect">
@@ -24371,13 +24505,53 @@
                 <a:buNone/>
               </a:pPr>
               <a:r>
-                <a:rPr lang="fr-FR" sz="2800" kern="1200" dirty="0"/>
+                <a:rPr lang="fr-FR" sz="2800" kern="1200" dirty="0">
+                  <a:solidFill>
+                    <a:schemeClr val="tx1"/>
+                  </a:solidFill>
+                </a:rPr>
                 <a:t>Dans le Repository, on retrouve des méthodes qui permettent de construire une requête DQL, que Doctrine va interpréter en SQL et solliciter la BDD.</a:t>
               </a:r>
             </a:p>
           </p:txBody>
         </p:sp>
       </p:grpSp>
+      <p:pic>
+        <p:nvPicPr>
+          <p:cNvPr id="18" name="Image 17">
+            <a:extLst>
+              <a:ext uri="{FF2B5EF4-FFF2-40B4-BE49-F238E27FC236}">
+                <a16:creationId xmlns:a16="http://schemas.microsoft.com/office/drawing/2014/main" id="{39FD9DF2-F64D-406B-A1E2-E53D050E60A6}"/>
+              </a:ext>
+            </a:extLst>
+          </p:cNvPr>
+          <p:cNvPicPr>
+            <a:picLocks noChangeAspect="1"/>
+          </p:cNvPicPr>
+          <p:nvPr/>
+        </p:nvPicPr>
+        <p:blipFill>
+          <a:blip r:embed="rId3">
+            <a:extLst>
+              <a:ext uri="{28A0092B-C50C-407E-A947-70E740481C1C}">
+                <a14:useLocalDpi xmlns:a14="http://schemas.microsoft.com/office/drawing/2010/main" val="0"/>
+              </a:ext>
+            </a:extLst>
+          </a:blip>
+          <a:stretch>
+            <a:fillRect/>
+          </a:stretch>
+        </p:blipFill>
+        <p:spPr>
+          <a:xfrm>
+            <a:off x="7880778" y="2143494"/>
+            <a:ext cx="2242277" cy="1471494"/>
+          </a:xfrm>
+          <a:prstGeom prst="rect">
+            <a:avLst/>
+          </a:prstGeom>
+        </p:spPr>
+      </p:pic>
     </p:spTree>
     <p:extLst>
       <p:ext uri="{BB962C8B-B14F-4D97-AF65-F5344CB8AC3E}">
@@ -24450,7 +24624,7 @@
               <a:tabLst/>
               <a:defRPr/>
             </a:pPr>
-            <a:fld id="{17B14172-D5F5-4BFB-89B6-FE98C0A91CE9}" type="datetime1">
+            <a:fld id="{53D2B490-03A2-4150-B32F-B5B580B7BD54}" type="datetime1">
               <a:rPr kumimoji="0" lang="fr-FR" b="0" i="0" u="none" strike="noStrike" kern="1200" cap="none" spc="0" normalizeH="0" baseline="0" noProof="0" smtClean="0">
                 <a:ln>
                   <a:noFill/>
@@ -24462,21 +24636,7 @@
                 <a:ea typeface="+mn-ea"/>
                 <a:cs typeface="+mn-cs"/>
               </a:rPr>
-              <a:pPr marL="0" marR="0" lvl="0" indent="0" defTabSz="457200" rtl="0" eaLnBrk="1" fontAlgn="auto" latinLnBrk="0" hangingPunct="1">
-                <a:spcBef>
-                  <a:spcPts val="0"/>
-                </a:spcBef>
-                <a:spcAft>
-                  <a:spcPts val="600"/>
-                </a:spcAft>
-                <a:buClrTx/>
-                <a:buSzTx/>
-                <a:buFontTx/>
-                <a:buNone/>
-                <a:tabLst/>
-                <a:defRPr/>
-              </a:pPr>
-              <a:t>08/06/2020</a:t>
+              <a:t>23/06/2020</a:t>
             </a:fld>
             <a:endParaRPr kumimoji="0" lang="fr-FR" b="0" i="0" u="none" strike="noStrike" kern="1200" cap="none" spc="0" normalizeH="0" baseline="0" noProof="0">
               <a:ln>
@@ -25310,14 +25470,9 @@
                 <a:spcPts val="600"/>
               </a:spcAft>
             </a:pPr>
-            <a:fld id="{17B14172-D5F5-4BFB-89B6-FE98C0A91CE9}" type="datetime1">
+            <a:fld id="{DCC95B5A-00F5-4032-9D11-659C3CDE3DD2}" type="datetime1">
               <a:rPr lang="fr-FR" smtClean="0"/>
-              <a:pPr>
-                <a:spcAft>
-                  <a:spcPts val="600"/>
-                </a:spcAft>
-              </a:pPr>
-              <a:t>08/06/2020</a:t>
+              <a:t>23/06/2020</a:t>
             </a:fld>
             <a:endParaRPr lang="fr-FR"/>
           </a:p>
@@ -25464,31 +25619,16 @@
           </p:spPr>
           <p:style>
             <a:lnRef idx="2">
-              <a:schemeClr val="lt1">
-                <a:hueOff val="0"/>
-                <a:satOff val="0"/>
-                <a:lumOff val="0"/>
-                <a:alphaOff val="0"/>
-              </a:schemeClr>
+              <a:schemeClr val="accent2"/>
             </a:lnRef>
             <a:fillRef idx="1">
-              <a:schemeClr val="accent1">
-                <a:hueOff val="0"/>
-                <a:satOff val="0"/>
-                <a:lumOff val="0"/>
-                <a:alphaOff val="0"/>
-              </a:schemeClr>
+              <a:schemeClr val="lt1"/>
             </a:fillRef>
             <a:effectRef idx="0">
-              <a:schemeClr val="accent1">
-                <a:hueOff val="0"/>
-                <a:satOff val="0"/>
-                <a:lumOff val="0"/>
-                <a:alphaOff val="0"/>
-              </a:schemeClr>
+              <a:schemeClr val="accent2"/>
             </a:effectRef>
             <a:fontRef idx="minor">
-              <a:schemeClr val="lt1"/>
+              <a:schemeClr val="dk1"/>
             </a:fontRef>
           </p:style>
         </p:sp>
@@ -25545,21 +25685,69 @@
                 </a:spcAft>
               </a:pPr>
               <a:r>
-                <a:rPr lang="fr-FR" sz="2800" dirty="0"/>
+                <a:rPr lang="fr-FR" sz="2800" dirty="0">
+                  <a:solidFill>
+                    <a:schemeClr val="tx1"/>
+                  </a:solidFill>
+                </a:rPr>
                 <a:t>La Vue, gérée par </a:t>
               </a:r>
               <a:r>
-                <a:rPr lang="fr-FR" sz="2800" dirty="0" err="1"/>
+                <a:rPr lang="fr-FR" sz="2800" dirty="0" err="1">
+                  <a:solidFill>
+                    <a:schemeClr val="tx1"/>
+                  </a:solidFill>
+                </a:rPr>
                 <a:t>Twig</a:t>
               </a:r>
               <a:r>
-                <a:rPr lang="fr-FR" sz="2800" dirty="0"/>
+                <a:rPr lang="fr-FR" sz="2800" dirty="0">
+                  <a:solidFill>
+                    <a:schemeClr val="tx1"/>
+                  </a:solidFill>
+                </a:rPr>
                 <a:t>, permet d’organiser, de conditionner le rendu de la page HTML que nous allons ensuite renvoyer à l’utilisateur.</a:t>
               </a:r>
             </a:p>
           </p:txBody>
         </p:sp>
       </p:grpSp>
+      <p:pic>
+        <p:nvPicPr>
+          <p:cNvPr id="12" name="Image 11">
+            <a:extLst>
+              <a:ext uri="{FF2B5EF4-FFF2-40B4-BE49-F238E27FC236}">
+                <a16:creationId xmlns:a16="http://schemas.microsoft.com/office/drawing/2014/main" id="{F925B326-8EBB-4272-977A-83AA462E447F}"/>
+              </a:ext>
+            </a:extLst>
+          </p:cNvPr>
+          <p:cNvPicPr>
+            <a:picLocks noChangeAspect="1"/>
+          </p:cNvPicPr>
+          <p:nvPr/>
+        </p:nvPicPr>
+        <p:blipFill>
+          <a:blip r:embed="rId2">
+            <a:extLst>
+              <a:ext uri="{28A0092B-C50C-407E-A947-70E740481C1C}">
+                <a14:useLocalDpi xmlns:a14="http://schemas.microsoft.com/office/drawing/2010/main" val="0"/>
+              </a:ext>
+            </a:extLst>
+          </a:blip>
+          <a:stretch>
+            <a:fillRect/>
+          </a:stretch>
+        </p:blipFill>
+        <p:spPr>
+          <a:xfrm>
+            <a:off x="7030271" y="563532"/>
+            <a:ext cx="2227725" cy="1386551"/>
+          </a:xfrm>
+          <a:prstGeom prst="rect">
+            <a:avLst/>
+          </a:prstGeom>
+        </p:spPr>
+      </p:pic>
     </p:spTree>
     <p:extLst>
       <p:ext uri="{BB962C8B-B14F-4D97-AF65-F5344CB8AC3E}">
@@ -25570,6 +25758,89 @@
   <p:clrMapOvr>
     <a:masterClrMapping/>
   </p:clrMapOvr>
+  <p:timing>
+    <p:tnLst>
+      <p:par>
+        <p:cTn id="1" dur="indefinite" restart="never" nodeType="tmRoot">
+          <p:childTnLst>
+            <p:seq concurrent="1" nextAc="seek">
+              <p:cTn id="2" dur="indefinite" nodeType="mainSeq">
+                <p:childTnLst>
+                  <p:par>
+                    <p:cTn id="3" fill="hold">
+                      <p:stCondLst>
+                        <p:cond delay="indefinite"/>
+                      </p:stCondLst>
+                      <p:childTnLst>
+                        <p:par>
+                          <p:cTn id="4" fill="hold">
+                            <p:stCondLst>
+                              <p:cond delay="0"/>
+                            </p:stCondLst>
+                            <p:childTnLst>
+                              <p:par>
+                                <p:cTn id="5" presetID="10" presetClass="entr" presetSubtype="0" fill="hold" nodeType="clickEffect">
+                                  <p:stCondLst>
+                                    <p:cond delay="0"/>
+                                  </p:stCondLst>
+                                  <p:childTnLst>
+                                    <p:set>
+                                      <p:cBhvr>
+                                        <p:cTn id="6" dur="1" fill="hold">
+                                          <p:stCondLst>
+                                            <p:cond delay="0"/>
+                                          </p:stCondLst>
+                                        </p:cTn>
+                                        <p:tgtEl>
+                                          <p:spTgt spid="12"/>
+                                        </p:tgtEl>
+                                        <p:attrNameLst>
+                                          <p:attrName>style.visibility</p:attrName>
+                                        </p:attrNameLst>
+                                      </p:cBhvr>
+                                      <p:to>
+                                        <p:strVal val="visible"/>
+                                      </p:to>
+                                    </p:set>
+                                    <p:animEffect transition="in" filter="fade">
+                                      <p:cBhvr>
+                                        <p:cTn id="7" dur="500"/>
+                                        <p:tgtEl>
+                                          <p:spTgt spid="12"/>
+                                        </p:tgtEl>
+                                      </p:cBhvr>
+                                    </p:animEffect>
+                                  </p:childTnLst>
+                                </p:cTn>
+                              </p:par>
+                            </p:childTnLst>
+                          </p:cTn>
+                        </p:par>
+                      </p:childTnLst>
+                    </p:cTn>
+                  </p:par>
+                </p:childTnLst>
+              </p:cTn>
+              <p:prevCondLst>
+                <p:cond evt="onPrev" delay="0">
+                  <p:tgtEl>
+                    <p:sldTgt/>
+                  </p:tgtEl>
+                </p:cond>
+              </p:prevCondLst>
+              <p:nextCondLst>
+                <p:cond evt="onNext" delay="0">
+                  <p:tgtEl>
+                    <p:sldTgt/>
+                  </p:tgtEl>
+                </p:cond>
+              </p:nextCondLst>
+            </p:seq>
+          </p:childTnLst>
+        </p:cTn>
+      </p:par>
+    </p:tnLst>
+  </p:timing>
 </p:sld>
 </file>
 
@@ -25611,9 +25882,9 @@
           <a:bodyPr/>
           <a:lstStyle/>
           <a:p>
-            <a:fld id="{17B14172-D5F5-4BFB-89B6-FE98C0A91CE9}" type="datetime1">
+            <a:fld id="{8FCE93CB-AC50-44DA-BCED-55F111109E31}" type="datetime1">
               <a:rPr lang="fr-FR" smtClean="0"/>
-              <a:t>08/06/2020</a:t>
+              <a:t>23/06/2020</a:t>
             </a:fld>
             <a:endParaRPr lang="fr-FR"/>
           </a:p>
@@ -27657,14 +27928,9 @@
                 <a:spcPts val="600"/>
               </a:spcAft>
             </a:pPr>
-            <a:fld id="{17B14172-D5F5-4BFB-89B6-FE98C0A91CE9}" type="datetime1">
+            <a:fld id="{61FAE38A-F13F-4DB6-BF52-762D68C15B48}" type="datetime1">
               <a:rPr lang="fr-FR" smtClean="0"/>
-              <a:pPr>
-                <a:spcAft>
-                  <a:spcPts val="600"/>
-                </a:spcAft>
-              </a:pPr>
-              <a:t>08/06/2020</a:t>
+              <a:t>23/06/2020</a:t>
             </a:fld>
             <a:endParaRPr lang="fr-FR"/>
           </a:p>
@@ -27914,6 +28180,216 @@
   <p:clrMapOvr>
     <a:masterClrMapping/>
   </p:clrMapOvr>
+  <p:timing>
+    <p:tnLst>
+      <p:par>
+        <p:cTn id="1" dur="indefinite" restart="never" nodeType="tmRoot">
+          <p:childTnLst>
+            <p:seq concurrent="1" nextAc="seek">
+              <p:cTn id="2" dur="indefinite" nodeType="mainSeq">
+                <p:childTnLst>
+                  <p:par>
+                    <p:cTn id="3" fill="hold">
+                      <p:stCondLst>
+                        <p:cond delay="indefinite"/>
+                      </p:stCondLst>
+                      <p:childTnLst>
+                        <p:par>
+                          <p:cTn id="4" fill="hold">
+                            <p:stCondLst>
+                              <p:cond delay="0"/>
+                            </p:stCondLst>
+                            <p:childTnLst>
+                              <p:par>
+                                <p:cTn id="5" presetID="10" presetClass="entr" presetSubtype="0" fill="hold" nodeType="clickEffect">
+                                  <p:stCondLst>
+                                    <p:cond delay="0"/>
+                                  </p:stCondLst>
+                                  <p:childTnLst>
+                                    <p:set>
+                                      <p:cBhvr>
+                                        <p:cTn id="6" dur="1" fill="hold">
+                                          <p:stCondLst>
+                                            <p:cond delay="0"/>
+                                          </p:stCondLst>
+                                        </p:cTn>
+                                        <p:tgtEl>
+                                          <p:spTgt spid="7"/>
+                                        </p:tgtEl>
+                                        <p:attrNameLst>
+                                          <p:attrName>style.visibility</p:attrName>
+                                        </p:attrNameLst>
+                                      </p:cBhvr>
+                                      <p:to>
+                                        <p:strVal val="visible"/>
+                                      </p:to>
+                                    </p:set>
+                                    <p:animEffect transition="in" filter="fade">
+                                      <p:cBhvr>
+                                        <p:cTn id="7" dur="500"/>
+                                        <p:tgtEl>
+                                          <p:spTgt spid="7"/>
+                                        </p:tgtEl>
+                                      </p:cBhvr>
+                                    </p:animEffect>
+                                  </p:childTnLst>
+                                </p:cTn>
+                              </p:par>
+                              <p:par>
+                                <p:cTn id="8" presetID="10" presetClass="entr" presetSubtype="0" fill="hold" grpId="0" nodeType="withEffect">
+                                  <p:stCondLst>
+                                    <p:cond delay="0"/>
+                                  </p:stCondLst>
+                                  <p:childTnLst>
+                                    <p:set>
+                                      <p:cBhvr>
+                                        <p:cTn id="9" dur="1" fill="hold">
+                                          <p:stCondLst>
+                                            <p:cond delay="0"/>
+                                          </p:stCondLst>
+                                        </p:cTn>
+                                        <p:tgtEl>
+                                          <p:spTgt spid="9"/>
+                                        </p:tgtEl>
+                                        <p:attrNameLst>
+                                          <p:attrName>style.visibility</p:attrName>
+                                        </p:attrNameLst>
+                                      </p:cBhvr>
+                                      <p:to>
+                                        <p:strVal val="visible"/>
+                                      </p:to>
+                                    </p:set>
+                                    <p:animEffect transition="in" filter="fade">
+                                      <p:cBhvr>
+                                        <p:cTn id="10" dur="500"/>
+                                        <p:tgtEl>
+                                          <p:spTgt spid="9"/>
+                                        </p:tgtEl>
+                                      </p:cBhvr>
+                                    </p:animEffect>
+                                  </p:childTnLst>
+                                </p:cTn>
+                              </p:par>
+                            </p:childTnLst>
+                          </p:cTn>
+                        </p:par>
+                      </p:childTnLst>
+                    </p:cTn>
+                  </p:par>
+                  <p:par>
+                    <p:cTn id="11" fill="hold">
+                      <p:stCondLst>
+                        <p:cond delay="indefinite"/>
+                      </p:stCondLst>
+                      <p:childTnLst>
+                        <p:par>
+                          <p:cTn id="12" fill="hold">
+                            <p:stCondLst>
+                              <p:cond delay="0"/>
+                            </p:stCondLst>
+                            <p:childTnLst>
+                              <p:par>
+                                <p:cTn id="13" presetID="10" presetClass="entr" presetSubtype="0" fill="hold" nodeType="clickEffect">
+                                  <p:stCondLst>
+                                    <p:cond delay="0"/>
+                                  </p:stCondLst>
+                                  <p:childTnLst>
+                                    <p:set>
+                                      <p:cBhvr>
+                                        <p:cTn id="14" dur="1" fill="hold">
+                                          <p:stCondLst>
+                                            <p:cond delay="0"/>
+                                          </p:stCondLst>
+                                        </p:cTn>
+                                        <p:tgtEl>
+                                          <p:spTgt spid="8"/>
+                                        </p:tgtEl>
+                                        <p:attrNameLst>
+                                          <p:attrName>style.visibility</p:attrName>
+                                        </p:attrNameLst>
+                                      </p:cBhvr>
+                                      <p:to>
+                                        <p:strVal val="visible"/>
+                                      </p:to>
+                                    </p:set>
+                                    <p:animEffect transition="in" filter="fade">
+                                      <p:cBhvr>
+                                        <p:cTn id="15" dur="500"/>
+                                        <p:tgtEl>
+                                          <p:spTgt spid="8"/>
+                                        </p:tgtEl>
+                                      </p:cBhvr>
+                                    </p:animEffect>
+                                  </p:childTnLst>
+                                </p:cTn>
+                              </p:par>
+                              <p:par>
+                                <p:cTn id="16" presetID="10" presetClass="entr" presetSubtype="0" fill="hold" grpId="0" nodeType="withEffect">
+                                  <p:stCondLst>
+                                    <p:cond delay="0"/>
+                                  </p:stCondLst>
+                                  <p:childTnLst>
+                                    <p:set>
+                                      <p:cBhvr>
+                                        <p:cTn id="17" dur="1" fill="hold">
+                                          <p:stCondLst>
+                                            <p:cond delay="0"/>
+                                          </p:stCondLst>
+                                        </p:cTn>
+                                        <p:tgtEl>
+                                          <p:spTgt spid="10"/>
+                                        </p:tgtEl>
+                                        <p:attrNameLst>
+                                          <p:attrName>style.visibility</p:attrName>
+                                        </p:attrNameLst>
+                                      </p:cBhvr>
+                                      <p:to>
+                                        <p:strVal val="visible"/>
+                                      </p:to>
+                                    </p:set>
+                                    <p:animEffect transition="in" filter="fade">
+                                      <p:cBhvr>
+                                        <p:cTn id="18" dur="500"/>
+                                        <p:tgtEl>
+                                          <p:spTgt spid="10"/>
+                                        </p:tgtEl>
+                                      </p:cBhvr>
+                                    </p:animEffect>
+                                  </p:childTnLst>
+                                </p:cTn>
+                              </p:par>
+                            </p:childTnLst>
+                          </p:cTn>
+                        </p:par>
+                      </p:childTnLst>
+                    </p:cTn>
+                  </p:par>
+                </p:childTnLst>
+              </p:cTn>
+              <p:prevCondLst>
+                <p:cond evt="onPrev" delay="0">
+                  <p:tgtEl>
+                    <p:sldTgt/>
+                  </p:tgtEl>
+                </p:cond>
+              </p:prevCondLst>
+              <p:nextCondLst>
+                <p:cond evt="onNext" delay="0">
+                  <p:tgtEl>
+                    <p:sldTgt/>
+                  </p:tgtEl>
+                </p:cond>
+              </p:nextCondLst>
+            </p:seq>
+          </p:childTnLst>
+        </p:cTn>
+      </p:par>
+    </p:tnLst>
+    <p:bldLst>
+      <p:bldP spid="9" grpId="0"/>
+      <p:bldP spid="10" grpId="0"/>
+    </p:bldLst>
+  </p:timing>
 </p:sld>
 </file>
 
@@ -28470,14 +28946,9 @@
                 <a:spcPts val="600"/>
               </a:spcAft>
             </a:pPr>
-            <a:fld id="{17B14172-D5F5-4BFB-89B6-FE98C0A91CE9}" type="datetime1">
-              <a:rPr lang="en-US" smtClean="0"/>
-              <a:pPr>
-                <a:spcAft>
-                  <a:spcPts val="600"/>
-                </a:spcAft>
-              </a:pPr>
-              <a:t>6/8/2020</a:t>
+            <a:fld id="{7E2CD4A2-9907-4C49-A541-9E228F1BC6A8}" type="datetime1">
+              <a:rPr lang="fr-FR" smtClean="0"/>
+              <a:t>23/06/2020</a:t>
             </a:fld>
             <a:endParaRPr lang="en-US"/>
           </a:p>
@@ -28632,6 +29103,1191 @@
 </file>
 
 <file path=ppt/slides/slide29.xml><?xml version="1.0" encoding="utf-8"?>
+<p:sld xmlns:a="http://schemas.openxmlformats.org/drawingml/2006/main" xmlns:r="http://schemas.openxmlformats.org/officeDocument/2006/relationships" xmlns:p="http://schemas.openxmlformats.org/presentationml/2006/main">
+  <p:cSld>
+    <p:bg>
+      <p:bgPr>
+        <a:solidFill>
+          <a:schemeClr val="bg1"/>
+        </a:solidFill>
+        <a:effectLst/>
+      </p:bgPr>
+    </p:bg>
+    <p:spTree>
+      <p:nvGrpSpPr>
+        <p:cNvPr id="1" name=""/>
+        <p:cNvGrpSpPr/>
+        <p:nvPr/>
+      </p:nvGrpSpPr>
+      <p:grpSpPr>
+        <a:xfrm>
+          <a:off x="0" y="0"/>
+          <a:ext cx="0" cy="0"/>
+          <a:chOff x="0" y="0"/>
+          <a:chExt cx="0" cy="0"/>
+        </a:xfrm>
+      </p:grpSpPr>
+      <p:sp useBgFill="1">
+        <p:nvSpPr>
+          <p:cNvPr id="43" name="Rectangle 42">
+            <a:extLst>
+              <a:ext uri="{FF2B5EF4-FFF2-40B4-BE49-F238E27FC236}">
+                <a16:creationId xmlns:a16="http://schemas.microsoft.com/office/drawing/2014/main" id="{3741B58E-3B65-4A01-A276-975AB2CF8A08}"/>
+              </a:ext>
+              <a:ext uri="{C183D7F6-B498-43B3-948B-1728B52AA6E4}">
+                <adec:decorative xmlns:adec="http://schemas.microsoft.com/office/drawing/2017/decorative" val="1"/>
+              </a:ext>
+            </a:extLst>
+          </p:cNvPr>
+          <p:cNvSpPr>
+            <a:spLocks noGrp="1" noRot="1" noChangeAspect="1" noMove="1" noResize="1" noEditPoints="1" noAdjustHandles="1" noChangeArrowheads="1" noChangeShapeType="1" noTextEdit="1"/>
+          </p:cNvSpPr>
+          <p:nvPr>
+            <p:extLst>
+              <p:ext uri="{386F3935-93C4-4BCD-93E2-E3B085C9AB24}">
+                <p16:designElem xmlns:p16="http://schemas.microsoft.com/office/powerpoint/2015/main" val="1"/>
+              </p:ext>
+            </p:extLst>
+          </p:nvPr>
+        </p:nvSpPr>
+        <p:spPr>
+          <a:xfrm>
+            <a:off x="0" y="0"/>
+            <a:ext cx="12186315" cy="6858000"/>
+          </a:xfrm>
+          <a:prstGeom prst="rect">
+            <a:avLst/>
+          </a:prstGeom>
+          <a:ln>
+            <a:noFill/>
+          </a:ln>
+        </p:spPr>
+        <p:style>
+          <a:lnRef idx="2">
+            <a:schemeClr val="accent6">
+              <a:shade val="50000"/>
+            </a:schemeClr>
+          </a:lnRef>
+          <a:fillRef idx="1001">
+            <a:schemeClr val="lt1"/>
+          </a:fillRef>
+          <a:effectRef idx="0">
+            <a:schemeClr val="accent6"/>
+          </a:effectRef>
+          <a:fontRef idx="minor">
+            <a:schemeClr val="lt1"/>
+          </a:fontRef>
+        </p:style>
+        <p:txBody>
+          <a:bodyPr rtlCol="0" anchor="ctr"/>
+          <a:lstStyle/>
+          <a:p>
+            <a:pPr algn="ctr"/>
+            <a:endParaRPr lang="en-US"/>
+          </a:p>
+        </p:txBody>
+      </p:sp>
+      <p:sp>
+        <p:nvSpPr>
+          <p:cNvPr id="45" name="Rectangle 44">
+            <a:extLst>
+              <a:ext uri="{FF2B5EF4-FFF2-40B4-BE49-F238E27FC236}">
+                <a16:creationId xmlns:a16="http://schemas.microsoft.com/office/drawing/2014/main" id="{7AAC67C3-831B-4AB1-A259-DFB839CAFAFC}"/>
+              </a:ext>
+              <a:ext uri="{C183D7F6-B498-43B3-948B-1728B52AA6E4}">
+                <adec:decorative xmlns:adec="http://schemas.microsoft.com/office/drawing/2017/decorative" val="1"/>
+              </a:ext>
+            </a:extLst>
+          </p:cNvPr>
+          <p:cNvSpPr>
+            <a:spLocks noGrp="1" noRot="1" noChangeAspect="1" noMove="1" noResize="1" noEditPoints="1" noAdjustHandles="1" noChangeArrowheads="1" noChangeShapeType="1" noTextEdit="1"/>
+          </p:cNvSpPr>
+          <p:nvPr>
+            <p:extLst>
+              <p:ext uri="{386F3935-93C4-4BCD-93E2-E3B085C9AB24}">
+                <p16:designElem xmlns:p16="http://schemas.microsoft.com/office/powerpoint/2015/main" val="1"/>
+              </p:ext>
+            </p:extLst>
+          </p:nvPr>
+        </p:nvSpPr>
+        <p:spPr>
+          <a:xfrm>
+            <a:off x="16" y="0"/>
+            <a:ext cx="4050791" cy="6858000"/>
+          </a:xfrm>
+          <a:prstGeom prst="rect">
+            <a:avLst/>
+          </a:prstGeom>
+          <a:solidFill>
+            <a:schemeClr val="accent2"/>
+          </a:solidFill>
+          <a:ln>
+            <a:noFill/>
+          </a:ln>
+        </p:spPr>
+        <p:style>
+          <a:lnRef idx="2">
+            <a:schemeClr val="accent1">
+              <a:shade val="50000"/>
+            </a:schemeClr>
+          </a:lnRef>
+          <a:fillRef idx="1">
+            <a:schemeClr val="accent1"/>
+          </a:fillRef>
+          <a:effectRef idx="0">
+            <a:schemeClr val="accent1"/>
+          </a:effectRef>
+          <a:fontRef idx="minor">
+            <a:schemeClr val="lt1"/>
+          </a:fontRef>
+        </p:style>
+      </p:sp>
+      <p:sp>
+        <p:nvSpPr>
+          <p:cNvPr id="36" name="Titre 35">
+            <a:extLst>
+              <a:ext uri="{FF2B5EF4-FFF2-40B4-BE49-F238E27FC236}">
+                <a16:creationId xmlns:a16="http://schemas.microsoft.com/office/drawing/2014/main" id="{2DEA8875-BA15-48EE-A8FA-E66152FEFE9F}"/>
+              </a:ext>
+            </a:extLst>
+          </p:cNvPr>
+          <p:cNvSpPr>
+            <a:spLocks noGrp="1"/>
+          </p:cNvSpPr>
+          <p:nvPr>
+            <p:ph type="title"/>
+          </p:nvPr>
+        </p:nvSpPr>
+        <p:spPr>
+          <a:xfrm>
+            <a:off x="100484" y="605896"/>
+            <a:ext cx="3822306" cy="5646208"/>
+          </a:xfrm>
+        </p:spPr>
+        <p:txBody>
+          <a:bodyPr anchor="ctr">
+            <a:normAutofit/>
+          </a:bodyPr>
+          <a:lstStyle/>
+          <a:p>
+            <a:r>
+              <a:rPr lang="fr-FR" sz="3600" dirty="0">
+                <a:solidFill>
+                  <a:srgbClr val="FFFFFF"/>
+                </a:solidFill>
+              </a:rPr>
+              <a:t>Axes d’améliorations</a:t>
+            </a:r>
+          </a:p>
+        </p:txBody>
+      </p:sp>
+      <p:sp>
+        <p:nvSpPr>
+          <p:cNvPr id="47" name="Rectangle 46">
+            <a:extLst>
+              <a:ext uri="{FF2B5EF4-FFF2-40B4-BE49-F238E27FC236}">
+                <a16:creationId xmlns:a16="http://schemas.microsoft.com/office/drawing/2014/main" id="{054B3F04-9EAC-45C0-B3CE-0387EEA10A0C}"/>
+              </a:ext>
+              <a:ext uri="{C183D7F6-B498-43B3-948B-1728B52AA6E4}">
+                <adec:decorative xmlns:adec="http://schemas.microsoft.com/office/drawing/2017/decorative" val="1"/>
+              </a:ext>
+            </a:extLst>
+          </p:cNvPr>
+          <p:cNvSpPr>
+            <a:spLocks noGrp="1" noRot="1" noChangeAspect="1" noMove="1" noResize="1" noEditPoints="1" noAdjustHandles="1" noChangeArrowheads="1" noChangeShapeType="1" noTextEdit="1"/>
+          </p:cNvSpPr>
+          <p:nvPr>
+            <p:extLst>
+              <p:ext uri="{386F3935-93C4-4BCD-93E2-E3B085C9AB24}">
+                <p16:designElem xmlns:p16="http://schemas.microsoft.com/office/powerpoint/2015/main" val="1"/>
+              </p:ext>
+            </p:extLst>
+          </p:nvPr>
+        </p:nvSpPr>
+        <p:spPr>
+          <a:xfrm>
+            <a:off x="4040071" y="0"/>
+            <a:ext cx="64008" cy="6858000"/>
+          </a:xfrm>
+          <a:prstGeom prst="rect">
+            <a:avLst/>
+          </a:prstGeom>
+          <a:solidFill>
+            <a:schemeClr val="accent1"/>
+          </a:solidFill>
+          <a:ln>
+            <a:noFill/>
+          </a:ln>
+        </p:spPr>
+        <p:style>
+          <a:lnRef idx="2">
+            <a:schemeClr val="accent1">
+              <a:shade val="50000"/>
+            </a:schemeClr>
+          </a:lnRef>
+          <a:fillRef idx="1">
+            <a:schemeClr val="accent1"/>
+          </a:fillRef>
+          <a:effectRef idx="0">
+            <a:schemeClr val="accent1"/>
+          </a:effectRef>
+          <a:fontRef idx="minor">
+            <a:schemeClr val="lt1"/>
+          </a:fontRef>
+        </p:style>
+      </p:sp>
+      <p:sp>
+        <p:nvSpPr>
+          <p:cNvPr id="38" name="Espace réservé du contenu 37">
+            <a:extLst>
+              <a:ext uri="{FF2B5EF4-FFF2-40B4-BE49-F238E27FC236}">
+                <a16:creationId xmlns:a16="http://schemas.microsoft.com/office/drawing/2014/main" id="{9BDF66D2-5521-4850-95BC-6A1E10D9CD18}"/>
+              </a:ext>
+            </a:extLst>
+          </p:cNvPr>
+          <p:cNvSpPr>
+            <a:spLocks noGrp="1"/>
+          </p:cNvSpPr>
+          <p:nvPr>
+            <p:ph idx="1"/>
+          </p:nvPr>
+        </p:nvSpPr>
+        <p:spPr>
+          <a:xfrm>
+            <a:off x="4742016" y="605896"/>
+            <a:ext cx="6413663" cy="5646208"/>
+          </a:xfrm>
+        </p:spPr>
+        <p:txBody>
+          <a:bodyPr anchor="ctr">
+            <a:normAutofit/>
+          </a:bodyPr>
+          <a:lstStyle/>
+          <a:p>
+            <a:pPr>
+              <a:buFont typeface="Wingdings" panose="05000000000000000000" pitchFamily="2" charset="2"/>
+              <a:buChar char="Ø"/>
+            </a:pPr>
+            <a:r>
+              <a:rPr lang="fr-FR" dirty="0"/>
+              <a:t> </a:t>
+            </a:r>
+            <a:r>
+              <a:rPr lang="fr-FR" strike="sngStrike" dirty="0"/>
+              <a:t>Plus d’interactions avec le principe des « Suivre » et des « J’aime »</a:t>
+            </a:r>
+          </a:p>
+          <a:p>
+            <a:pPr marL="0" indent="0">
+              <a:buNone/>
+            </a:pPr>
+            <a:endParaRPr lang="fr-FR" dirty="0"/>
+          </a:p>
+          <a:p>
+            <a:pPr>
+              <a:buFont typeface="Wingdings" panose="05000000000000000000" pitchFamily="2" charset="2"/>
+              <a:buChar char="Ø"/>
+            </a:pPr>
+            <a:r>
+              <a:rPr lang="fr-FR" dirty="0"/>
+              <a:t> Créer des albums photos</a:t>
+            </a:r>
+          </a:p>
+          <a:p>
+            <a:pPr marL="0" indent="0">
+              <a:buNone/>
+            </a:pPr>
+            <a:endParaRPr lang="fr-FR" dirty="0"/>
+          </a:p>
+          <a:p>
+            <a:pPr>
+              <a:buFont typeface="Wingdings" panose="05000000000000000000" pitchFamily="2" charset="2"/>
+              <a:buChar char="Ø"/>
+            </a:pPr>
+            <a:r>
+              <a:rPr lang="fr-FR" dirty="0"/>
+              <a:t> Créer un chat en temps réel</a:t>
+            </a:r>
+          </a:p>
+          <a:p>
+            <a:pPr marL="0" indent="0">
+              <a:buNone/>
+            </a:pPr>
+            <a:endParaRPr lang="fr-FR" dirty="0"/>
+          </a:p>
+          <a:p>
+            <a:pPr>
+              <a:buFont typeface="Wingdings" panose="05000000000000000000" pitchFamily="2" charset="2"/>
+              <a:buChar char="Ø"/>
+            </a:pPr>
+            <a:r>
+              <a:rPr lang="fr-FR" dirty="0"/>
+              <a:t> Repenser l’application avec un </a:t>
+            </a:r>
+            <a:r>
+              <a:rPr lang="fr-FR" dirty="0" err="1"/>
+              <a:t>framework</a:t>
+            </a:r>
+            <a:r>
+              <a:rPr lang="fr-FR" dirty="0"/>
+              <a:t> JS</a:t>
+            </a:r>
+          </a:p>
+          <a:p>
+            <a:pPr marL="0" indent="0">
+              <a:buNone/>
+            </a:pPr>
+            <a:endParaRPr lang="fr-FR" dirty="0"/>
+          </a:p>
+        </p:txBody>
+      </p:sp>
+      <p:sp>
+        <p:nvSpPr>
+          <p:cNvPr id="4" name="Espace réservé de la date 3">
+            <a:extLst>
+              <a:ext uri="{FF2B5EF4-FFF2-40B4-BE49-F238E27FC236}">
+                <a16:creationId xmlns:a16="http://schemas.microsoft.com/office/drawing/2014/main" id="{BD02E174-AA71-4B86-ADC1-36A9CBF0C3DE}"/>
+              </a:ext>
+            </a:extLst>
+          </p:cNvPr>
+          <p:cNvSpPr>
+            <a:spLocks noGrp="1"/>
+          </p:cNvSpPr>
+          <p:nvPr>
+            <p:ph type="dt" sz="half" idx="10"/>
+          </p:nvPr>
+        </p:nvSpPr>
+        <p:spPr>
+          <a:xfrm>
+            <a:off x="492370" y="6459785"/>
+            <a:ext cx="1735371" cy="365125"/>
+          </a:xfrm>
+        </p:spPr>
+        <p:txBody>
+          <a:bodyPr vert="horz" lIns="91440" tIns="45720" rIns="91440" bIns="45720" rtlCol="0">
+            <a:normAutofit/>
+          </a:bodyPr>
+          <a:lstStyle/>
+          <a:p>
+            <a:pPr defTabSz="914400">
+              <a:spcAft>
+                <a:spcPts val="600"/>
+              </a:spcAft>
+            </a:pPr>
+            <a:fld id="{BE2B0635-2F10-4392-9910-9200623560C3}" type="datetime1">
+              <a:rPr lang="fr-FR" smtClean="0"/>
+              <a:t>23/06/2020</a:t>
+            </a:fld>
+            <a:endParaRPr lang="en-US" dirty="0"/>
+          </a:p>
+        </p:txBody>
+      </p:sp>
+      <p:sp>
+        <p:nvSpPr>
+          <p:cNvPr id="5" name="Espace réservé du pied de page 4">
+            <a:extLst>
+              <a:ext uri="{FF2B5EF4-FFF2-40B4-BE49-F238E27FC236}">
+                <a16:creationId xmlns:a16="http://schemas.microsoft.com/office/drawing/2014/main" id="{EDB3DF03-1EAA-4274-9C36-167C5512A7F9}"/>
+              </a:ext>
+            </a:extLst>
+          </p:cNvPr>
+          <p:cNvSpPr>
+            <a:spLocks noGrp="1"/>
+          </p:cNvSpPr>
+          <p:nvPr>
+            <p:ph type="ftr" sz="quarter" idx="11"/>
+          </p:nvPr>
+        </p:nvSpPr>
+        <p:spPr>
+          <a:xfrm>
+            <a:off x="4742017" y="6459785"/>
+            <a:ext cx="5105169" cy="365125"/>
+          </a:xfrm>
+        </p:spPr>
+        <p:txBody>
+          <a:bodyPr vert="horz" lIns="91440" tIns="45720" rIns="91440" bIns="45720" rtlCol="0">
+            <a:normAutofit/>
+          </a:bodyPr>
+          <a:lstStyle/>
+          <a:p>
+            <a:pPr algn="l" defTabSz="914400">
+              <a:spcAft>
+                <a:spcPts val="600"/>
+              </a:spcAft>
+            </a:pPr>
+            <a:r>
+              <a:rPr lang="en-US" kern="1200" cap="all" baseline="0" dirty="0">
+                <a:solidFill>
+                  <a:schemeClr val="tx2"/>
+                </a:solidFill>
+                <a:latin typeface="+mn-lt"/>
+                <a:ea typeface="+mn-ea"/>
+                <a:cs typeface="+mn-cs"/>
+              </a:rPr>
+              <a:t>Sylvain ALLAIN</a:t>
+            </a:r>
+          </a:p>
+        </p:txBody>
+      </p:sp>
+      <p:sp>
+        <p:nvSpPr>
+          <p:cNvPr id="6" name="Espace réservé du numéro de diapositive 5">
+            <a:extLst>
+              <a:ext uri="{FF2B5EF4-FFF2-40B4-BE49-F238E27FC236}">
+                <a16:creationId xmlns:a16="http://schemas.microsoft.com/office/drawing/2014/main" id="{7C6D9CEF-3163-4A6B-AD56-64D157637798}"/>
+              </a:ext>
+            </a:extLst>
+          </p:cNvPr>
+          <p:cNvSpPr>
+            <a:spLocks noGrp="1"/>
+          </p:cNvSpPr>
+          <p:nvPr>
+            <p:ph type="sldNum" sz="quarter" idx="12"/>
+          </p:nvPr>
+        </p:nvSpPr>
+        <p:spPr>
+          <a:xfrm>
+            <a:off x="10123055" y="6459785"/>
+            <a:ext cx="1089428" cy="365125"/>
+          </a:xfrm>
+        </p:spPr>
+        <p:txBody>
+          <a:bodyPr vert="horz" lIns="91440" tIns="45720" rIns="91440" bIns="45720" rtlCol="0">
+            <a:normAutofit/>
+          </a:bodyPr>
+          <a:lstStyle/>
+          <a:p>
+            <a:pPr defTabSz="914400">
+              <a:spcAft>
+                <a:spcPts val="600"/>
+              </a:spcAft>
+            </a:pPr>
+            <a:fld id="{7386E8C7-F2FE-4BD9-8CCD-17179851D3F5}" type="slidenum">
+              <a:rPr lang="en-US">
+                <a:solidFill>
+                  <a:schemeClr val="tx2"/>
+                </a:solidFill>
+              </a:rPr>
+              <a:pPr defTabSz="914400">
+                <a:spcAft>
+                  <a:spcPts val="600"/>
+                </a:spcAft>
+              </a:pPr>
+              <a:t>29</a:t>
+            </a:fld>
+            <a:endParaRPr lang="en-US" dirty="0">
+              <a:solidFill>
+                <a:schemeClr val="tx2"/>
+              </a:solidFill>
+            </a:endParaRPr>
+          </a:p>
+        </p:txBody>
+      </p:sp>
+    </p:spTree>
+    <p:extLst>
+      <p:ext uri="{BB962C8B-B14F-4D97-AF65-F5344CB8AC3E}">
+        <p14:creationId xmlns:p14="http://schemas.microsoft.com/office/powerpoint/2010/main" val="2252160992"/>
+      </p:ext>
+    </p:extLst>
+  </p:cSld>
+  <p:clrMapOvr>
+    <a:masterClrMapping/>
+  </p:clrMapOvr>
+  <p:timing>
+    <p:tnLst>
+      <p:par>
+        <p:cTn id="1" dur="indefinite" restart="never" nodeType="tmRoot">
+          <p:childTnLst>
+            <p:seq concurrent="1" nextAc="seek">
+              <p:cTn id="2" dur="indefinite" nodeType="mainSeq">
+                <p:childTnLst>
+                  <p:par>
+                    <p:cTn id="3" fill="hold">
+                      <p:stCondLst>
+                        <p:cond delay="indefinite"/>
+                      </p:stCondLst>
+                      <p:childTnLst>
+                        <p:par>
+                          <p:cTn id="4" fill="hold">
+                            <p:stCondLst>
+                              <p:cond delay="0"/>
+                            </p:stCondLst>
+                            <p:childTnLst>
+                              <p:par>
+                                <p:cTn id="5" presetID="10" presetClass="entr" presetSubtype="0" fill="hold" nodeType="clickEffect">
+                                  <p:stCondLst>
+                                    <p:cond delay="0"/>
+                                  </p:stCondLst>
+                                  <p:childTnLst>
+                                    <p:set>
+                                      <p:cBhvr>
+                                        <p:cTn id="6" dur="1" fill="hold">
+                                          <p:stCondLst>
+                                            <p:cond delay="0"/>
+                                          </p:stCondLst>
+                                        </p:cTn>
+                                        <p:tgtEl>
+                                          <p:spTgt spid="38">
+                                            <p:txEl>
+                                              <p:pRg st="0" end="0"/>
+                                            </p:txEl>
+                                          </p:spTgt>
+                                        </p:tgtEl>
+                                        <p:attrNameLst>
+                                          <p:attrName>style.visibility</p:attrName>
+                                        </p:attrNameLst>
+                                      </p:cBhvr>
+                                      <p:to>
+                                        <p:strVal val="visible"/>
+                                      </p:to>
+                                    </p:set>
+                                    <p:animEffect transition="in" filter="fade">
+                                      <p:cBhvr>
+                                        <p:cTn id="7" dur="500"/>
+                                        <p:tgtEl>
+                                          <p:spTgt spid="38">
+                                            <p:txEl>
+                                              <p:pRg st="0" end="0"/>
+                                            </p:txEl>
+                                          </p:spTgt>
+                                        </p:tgtEl>
+                                      </p:cBhvr>
+                                    </p:animEffect>
+                                  </p:childTnLst>
+                                </p:cTn>
+                              </p:par>
+                            </p:childTnLst>
+                          </p:cTn>
+                        </p:par>
+                      </p:childTnLst>
+                    </p:cTn>
+                  </p:par>
+                  <p:par>
+                    <p:cTn id="8" fill="hold">
+                      <p:stCondLst>
+                        <p:cond delay="indefinite"/>
+                      </p:stCondLst>
+                      <p:childTnLst>
+                        <p:par>
+                          <p:cTn id="9" fill="hold">
+                            <p:stCondLst>
+                              <p:cond delay="0"/>
+                            </p:stCondLst>
+                            <p:childTnLst>
+                              <p:par>
+                                <p:cTn id="10" presetID="10" presetClass="entr" presetSubtype="0" fill="hold" nodeType="clickEffect">
+                                  <p:stCondLst>
+                                    <p:cond delay="0"/>
+                                  </p:stCondLst>
+                                  <p:childTnLst>
+                                    <p:set>
+                                      <p:cBhvr>
+                                        <p:cTn id="11" dur="1" fill="hold">
+                                          <p:stCondLst>
+                                            <p:cond delay="0"/>
+                                          </p:stCondLst>
+                                        </p:cTn>
+                                        <p:tgtEl>
+                                          <p:spTgt spid="38">
+                                            <p:txEl>
+                                              <p:pRg st="2" end="2"/>
+                                            </p:txEl>
+                                          </p:spTgt>
+                                        </p:tgtEl>
+                                        <p:attrNameLst>
+                                          <p:attrName>style.visibility</p:attrName>
+                                        </p:attrNameLst>
+                                      </p:cBhvr>
+                                      <p:to>
+                                        <p:strVal val="visible"/>
+                                      </p:to>
+                                    </p:set>
+                                    <p:animEffect transition="in" filter="fade">
+                                      <p:cBhvr>
+                                        <p:cTn id="12" dur="500"/>
+                                        <p:tgtEl>
+                                          <p:spTgt spid="38">
+                                            <p:txEl>
+                                              <p:pRg st="2" end="2"/>
+                                            </p:txEl>
+                                          </p:spTgt>
+                                        </p:tgtEl>
+                                      </p:cBhvr>
+                                    </p:animEffect>
+                                  </p:childTnLst>
+                                </p:cTn>
+                              </p:par>
+                            </p:childTnLst>
+                          </p:cTn>
+                        </p:par>
+                      </p:childTnLst>
+                    </p:cTn>
+                  </p:par>
+                  <p:par>
+                    <p:cTn id="13" fill="hold">
+                      <p:stCondLst>
+                        <p:cond delay="indefinite"/>
+                      </p:stCondLst>
+                      <p:childTnLst>
+                        <p:par>
+                          <p:cTn id="14" fill="hold">
+                            <p:stCondLst>
+                              <p:cond delay="0"/>
+                            </p:stCondLst>
+                            <p:childTnLst>
+                              <p:par>
+                                <p:cTn id="15" presetID="10" presetClass="entr" presetSubtype="0" fill="hold" nodeType="clickEffect">
+                                  <p:stCondLst>
+                                    <p:cond delay="0"/>
+                                  </p:stCondLst>
+                                  <p:childTnLst>
+                                    <p:set>
+                                      <p:cBhvr>
+                                        <p:cTn id="16" dur="1" fill="hold">
+                                          <p:stCondLst>
+                                            <p:cond delay="0"/>
+                                          </p:stCondLst>
+                                        </p:cTn>
+                                        <p:tgtEl>
+                                          <p:spTgt spid="38">
+                                            <p:txEl>
+                                              <p:pRg st="4" end="4"/>
+                                            </p:txEl>
+                                          </p:spTgt>
+                                        </p:tgtEl>
+                                        <p:attrNameLst>
+                                          <p:attrName>style.visibility</p:attrName>
+                                        </p:attrNameLst>
+                                      </p:cBhvr>
+                                      <p:to>
+                                        <p:strVal val="visible"/>
+                                      </p:to>
+                                    </p:set>
+                                    <p:animEffect transition="in" filter="fade">
+                                      <p:cBhvr>
+                                        <p:cTn id="17" dur="500"/>
+                                        <p:tgtEl>
+                                          <p:spTgt spid="38">
+                                            <p:txEl>
+                                              <p:pRg st="4" end="4"/>
+                                            </p:txEl>
+                                          </p:spTgt>
+                                        </p:tgtEl>
+                                      </p:cBhvr>
+                                    </p:animEffect>
+                                  </p:childTnLst>
+                                </p:cTn>
+                              </p:par>
+                            </p:childTnLst>
+                          </p:cTn>
+                        </p:par>
+                      </p:childTnLst>
+                    </p:cTn>
+                  </p:par>
+                  <p:par>
+                    <p:cTn id="18" fill="hold">
+                      <p:stCondLst>
+                        <p:cond delay="indefinite"/>
+                      </p:stCondLst>
+                      <p:childTnLst>
+                        <p:par>
+                          <p:cTn id="19" fill="hold">
+                            <p:stCondLst>
+                              <p:cond delay="0"/>
+                            </p:stCondLst>
+                            <p:childTnLst>
+                              <p:par>
+                                <p:cTn id="20" presetID="10" presetClass="entr" presetSubtype="0" fill="hold" nodeType="clickEffect">
+                                  <p:stCondLst>
+                                    <p:cond delay="0"/>
+                                  </p:stCondLst>
+                                  <p:childTnLst>
+                                    <p:set>
+                                      <p:cBhvr>
+                                        <p:cTn id="21" dur="1" fill="hold">
+                                          <p:stCondLst>
+                                            <p:cond delay="0"/>
+                                          </p:stCondLst>
+                                        </p:cTn>
+                                        <p:tgtEl>
+                                          <p:spTgt spid="38">
+                                            <p:txEl>
+                                              <p:pRg st="6" end="6"/>
+                                            </p:txEl>
+                                          </p:spTgt>
+                                        </p:tgtEl>
+                                        <p:attrNameLst>
+                                          <p:attrName>style.visibility</p:attrName>
+                                        </p:attrNameLst>
+                                      </p:cBhvr>
+                                      <p:to>
+                                        <p:strVal val="visible"/>
+                                      </p:to>
+                                    </p:set>
+                                    <p:animEffect transition="in" filter="fade">
+                                      <p:cBhvr>
+                                        <p:cTn id="22" dur="500"/>
+                                        <p:tgtEl>
+                                          <p:spTgt spid="38">
+                                            <p:txEl>
+                                              <p:pRg st="6" end="6"/>
+                                            </p:txEl>
+                                          </p:spTgt>
+                                        </p:tgtEl>
+                                      </p:cBhvr>
+                                    </p:animEffect>
+                                  </p:childTnLst>
+                                </p:cTn>
+                              </p:par>
+                            </p:childTnLst>
+                          </p:cTn>
+                        </p:par>
+                      </p:childTnLst>
+                    </p:cTn>
+                  </p:par>
+                </p:childTnLst>
+              </p:cTn>
+              <p:prevCondLst>
+                <p:cond evt="onPrev" delay="0">
+                  <p:tgtEl>
+                    <p:sldTgt/>
+                  </p:tgtEl>
+                </p:cond>
+              </p:prevCondLst>
+              <p:nextCondLst>
+                <p:cond evt="onNext" delay="0">
+                  <p:tgtEl>
+                    <p:sldTgt/>
+                  </p:tgtEl>
+                </p:cond>
+              </p:nextCondLst>
+            </p:seq>
+          </p:childTnLst>
+        </p:cTn>
+      </p:par>
+    </p:tnLst>
+  </p:timing>
+</p:sld>
+</file>
+
+<file path=ppt/slides/slide3.xml><?xml version="1.0" encoding="utf-8"?>
+<p:sld xmlns:a="http://schemas.openxmlformats.org/drawingml/2006/main" xmlns:r="http://schemas.openxmlformats.org/officeDocument/2006/relationships" xmlns:p="http://schemas.openxmlformats.org/presentationml/2006/main">
+  <p:cSld>
+    <p:bg>
+      <p:bgPr>
+        <a:solidFill>
+          <a:schemeClr val="bg1"/>
+        </a:solidFill>
+        <a:effectLst/>
+      </p:bgPr>
+    </p:bg>
+    <p:spTree>
+      <p:nvGrpSpPr>
+        <p:cNvPr id="1" name=""/>
+        <p:cNvGrpSpPr/>
+        <p:nvPr/>
+      </p:nvGrpSpPr>
+      <p:grpSpPr>
+        <a:xfrm>
+          <a:off x="0" y="0"/>
+          <a:ext cx="0" cy="0"/>
+          <a:chOff x="0" y="0"/>
+          <a:chExt cx="0" cy="0"/>
+        </a:xfrm>
+      </p:grpSpPr>
+      <p:sp useBgFill="1">
+        <p:nvSpPr>
+          <p:cNvPr id="32" name="Rectangle 31">
+            <a:extLst>
+              <a:ext uri="{FF2B5EF4-FFF2-40B4-BE49-F238E27FC236}">
+                <a16:creationId xmlns:a16="http://schemas.microsoft.com/office/drawing/2014/main" id="{9F5E263C-FB7E-4A3E-AD04-5140CD3D1D97}"/>
+              </a:ext>
+              <a:ext uri="{C183D7F6-B498-43B3-948B-1728B52AA6E4}">
+                <adec:decorative xmlns:adec="http://schemas.microsoft.com/office/drawing/2017/decorative" val="1"/>
+              </a:ext>
+            </a:extLst>
+          </p:cNvPr>
+          <p:cNvSpPr>
+            <a:spLocks noGrp="1" noRot="1" noChangeAspect="1" noMove="1" noResize="1" noEditPoints="1" noAdjustHandles="1" noChangeArrowheads="1" noChangeShapeType="1" noTextEdit="1"/>
+          </p:cNvSpPr>
+          <p:nvPr>
+            <p:extLst>
+              <p:ext uri="{386F3935-93C4-4BCD-93E2-E3B085C9AB24}">
+                <p16:designElem xmlns:p16="http://schemas.microsoft.com/office/powerpoint/2015/main" val="1"/>
+              </p:ext>
+            </p:extLst>
+          </p:nvPr>
+        </p:nvSpPr>
+        <p:spPr>
+          <a:xfrm>
+            <a:off x="0" y="0"/>
+            <a:ext cx="12186315" cy="6858000"/>
+          </a:xfrm>
+          <a:prstGeom prst="rect">
+            <a:avLst/>
+          </a:prstGeom>
+          <a:ln>
+            <a:noFill/>
+          </a:ln>
+        </p:spPr>
+        <p:style>
+          <a:lnRef idx="2">
+            <a:schemeClr val="accent6">
+              <a:shade val="50000"/>
+            </a:schemeClr>
+          </a:lnRef>
+          <a:fillRef idx="1001">
+            <a:schemeClr val="lt1"/>
+          </a:fillRef>
+          <a:effectRef idx="0">
+            <a:schemeClr val="accent6"/>
+          </a:effectRef>
+          <a:fontRef idx="minor">
+            <a:schemeClr val="lt1"/>
+          </a:fontRef>
+        </p:style>
+        <p:txBody>
+          <a:bodyPr rtlCol="0" anchor="ctr"/>
+          <a:lstStyle/>
+          <a:p>
+            <a:pPr algn="ctr"/>
+            <a:endParaRPr lang="en-US"/>
+          </a:p>
+        </p:txBody>
+      </p:sp>
+      <p:sp>
+        <p:nvSpPr>
+          <p:cNvPr id="34" name="Rectangle 33">
+            <a:extLst>
+              <a:ext uri="{FF2B5EF4-FFF2-40B4-BE49-F238E27FC236}">
+                <a16:creationId xmlns:a16="http://schemas.microsoft.com/office/drawing/2014/main" id="{9E65ED8C-90F7-4EB0-ACCB-64AEF411E8B9}"/>
+              </a:ext>
+              <a:ext uri="{C183D7F6-B498-43B3-948B-1728B52AA6E4}">
+                <adec:decorative xmlns:adec="http://schemas.microsoft.com/office/drawing/2017/decorative" val="1"/>
+              </a:ext>
+            </a:extLst>
+          </p:cNvPr>
+          <p:cNvSpPr>
+            <a:spLocks noGrp="1" noRot="1" noChangeAspect="1" noMove="1" noResize="1" noEditPoints="1" noAdjustHandles="1" noChangeArrowheads="1" noChangeShapeType="1" noTextEdit="1"/>
+          </p:cNvSpPr>
+          <p:nvPr>
+            <p:extLst>
+              <p:ext uri="{386F3935-93C4-4BCD-93E2-E3B085C9AB24}">
+                <p16:designElem xmlns:p16="http://schemas.microsoft.com/office/powerpoint/2015/main" val="1"/>
+              </p:ext>
+            </p:extLst>
+          </p:nvPr>
+        </p:nvSpPr>
+        <p:spPr>
+          <a:xfrm>
+            <a:off x="16" y="0"/>
+            <a:ext cx="4050791" cy="6858000"/>
+          </a:xfrm>
+          <a:prstGeom prst="rect">
+            <a:avLst/>
+          </a:prstGeom>
+          <a:solidFill>
+            <a:schemeClr val="accent2"/>
+          </a:solidFill>
+          <a:ln>
+            <a:noFill/>
+          </a:ln>
+        </p:spPr>
+        <p:style>
+          <a:lnRef idx="2">
+            <a:schemeClr val="accent1">
+              <a:shade val="50000"/>
+            </a:schemeClr>
+          </a:lnRef>
+          <a:fillRef idx="1">
+            <a:schemeClr val="accent1"/>
+          </a:fillRef>
+          <a:effectRef idx="0">
+            <a:schemeClr val="accent1"/>
+          </a:effectRef>
+          <a:fontRef idx="minor">
+            <a:schemeClr val="lt1"/>
+          </a:fontRef>
+        </p:style>
+      </p:sp>
+      <p:sp>
+        <p:nvSpPr>
+          <p:cNvPr id="7" name="Titre 6">
+            <a:extLst>
+              <a:ext uri="{FF2B5EF4-FFF2-40B4-BE49-F238E27FC236}">
+                <a16:creationId xmlns:a16="http://schemas.microsoft.com/office/drawing/2014/main" id="{8B098FDD-3C78-425B-AFEC-EE9C45D42833}"/>
+              </a:ext>
+            </a:extLst>
+          </p:cNvPr>
+          <p:cNvSpPr>
+            <a:spLocks noGrp="1"/>
+          </p:cNvSpPr>
+          <p:nvPr>
+            <p:ph type="title"/>
+          </p:nvPr>
+        </p:nvSpPr>
+        <p:spPr>
+          <a:xfrm>
+            <a:off x="492370" y="516835"/>
+            <a:ext cx="3084844" cy="5772840"/>
+          </a:xfrm>
+        </p:spPr>
+        <p:txBody>
+          <a:bodyPr anchor="ctr">
+            <a:normAutofit/>
+          </a:bodyPr>
+          <a:lstStyle/>
+          <a:p>
+            <a:r>
+              <a:rPr lang="fr-FR" sz="3600">
+                <a:solidFill>
+                  <a:srgbClr val="FFFFFF"/>
+                </a:solidFill>
+              </a:rPr>
+              <a:t>Contexte</a:t>
+            </a:r>
+          </a:p>
+        </p:txBody>
+      </p:sp>
+      <p:sp>
+        <p:nvSpPr>
+          <p:cNvPr id="36" name="Rectangle 35">
+            <a:extLst>
+              <a:ext uri="{FF2B5EF4-FFF2-40B4-BE49-F238E27FC236}">
+                <a16:creationId xmlns:a16="http://schemas.microsoft.com/office/drawing/2014/main" id="{6604E3BF-88F7-4D19-BEC9-8486966EA467}"/>
+              </a:ext>
+              <a:ext uri="{C183D7F6-B498-43B3-948B-1728B52AA6E4}">
+                <adec:decorative xmlns:adec="http://schemas.microsoft.com/office/drawing/2017/decorative" val="1"/>
+              </a:ext>
+            </a:extLst>
+          </p:cNvPr>
+          <p:cNvSpPr>
+            <a:spLocks noGrp="1" noRot="1" noChangeAspect="1" noMove="1" noResize="1" noEditPoints="1" noAdjustHandles="1" noChangeArrowheads="1" noChangeShapeType="1" noTextEdit="1"/>
+          </p:cNvSpPr>
+          <p:nvPr>
+            <p:extLst>
+              <p:ext uri="{386F3935-93C4-4BCD-93E2-E3B085C9AB24}">
+                <p16:designElem xmlns:p16="http://schemas.microsoft.com/office/powerpoint/2015/main" val="1"/>
+              </p:ext>
+            </p:extLst>
+          </p:nvPr>
+        </p:nvSpPr>
+        <p:spPr>
+          <a:xfrm>
+            <a:off x="4040071" y="0"/>
+            <a:ext cx="64008" cy="6858000"/>
+          </a:xfrm>
+          <a:prstGeom prst="rect">
+            <a:avLst/>
+          </a:prstGeom>
+          <a:solidFill>
+            <a:schemeClr val="accent1"/>
+          </a:solidFill>
+          <a:ln>
+            <a:noFill/>
+          </a:ln>
+        </p:spPr>
+        <p:style>
+          <a:lnRef idx="2">
+            <a:schemeClr val="accent1">
+              <a:shade val="50000"/>
+            </a:schemeClr>
+          </a:lnRef>
+          <a:fillRef idx="1">
+            <a:schemeClr val="accent1"/>
+          </a:fillRef>
+          <a:effectRef idx="0">
+            <a:schemeClr val="accent1"/>
+          </a:effectRef>
+          <a:fontRef idx="minor">
+            <a:schemeClr val="lt1"/>
+          </a:fontRef>
+        </p:style>
+      </p:sp>
+      <p:sp>
+        <p:nvSpPr>
+          <p:cNvPr id="4" name="Espace réservé de la date 3">
+            <a:extLst>
+              <a:ext uri="{FF2B5EF4-FFF2-40B4-BE49-F238E27FC236}">
+                <a16:creationId xmlns:a16="http://schemas.microsoft.com/office/drawing/2014/main" id="{093EFC05-08DC-4096-986B-A28CD7D52088}"/>
+              </a:ext>
+            </a:extLst>
+          </p:cNvPr>
+          <p:cNvSpPr>
+            <a:spLocks noGrp="1"/>
+          </p:cNvSpPr>
+          <p:nvPr>
+            <p:ph type="dt" sz="half" idx="10"/>
+          </p:nvPr>
+        </p:nvSpPr>
+        <p:spPr>
+          <a:xfrm>
+            <a:off x="492370" y="6459785"/>
+            <a:ext cx="1735371" cy="365125"/>
+          </a:xfrm>
+        </p:spPr>
+        <p:txBody>
+          <a:bodyPr>
+            <a:normAutofit/>
+          </a:bodyPr>
+          <a:lstStyle/>
+          <a:p>
+            <a:pPr>
+              <a:spcAft>
+                <a:spcPts val="600"/>
+              </a:spcAft>
+            </a:pPr>
+            <a:fld id="{A2803A18-E7CC-486E-9F20-93A95992AA11}" type="datetime1">
+              <a:rPr lang="fr-FR" smtClean="0"/>
+              <a:t>23/06/2020</a:t>
+            </a:fld>
+            <a:endParaRPr lang="fr-FR"/>
+          </a:p>
+        </p:txBody>
+      </p:sp>
+      <p:sp>
+        <p:nvSpPr>
+          <p:cNvPr id="5" name="Espace réservé du pied de page 4">
+            <a:extLst>
+              <a:ext uri="{FF2B5EF4-FFF2-40B4-BE49-F238E27FC236}">
+                <a16:creationId xmlns:a16="http://schemas.microsoft.com/office/drawing/2014/main" id="{DCFF5CD2-805F-4C3A-BB99-2A1794D98820}"/>
+              </a:ext>
+            </a:extLst>
+          </p:cNvPr>
+          <p:cNvSpPr>
+            <a:spLocks noGrp="1"/>
+          </p:cNvSpPr>
+          <p:nvPr>
+            <p:ph type="ftr" sz="quarter" idx="11"/>
+          </p:nvPr>
+        </p:nvSpPr>
+        <p:spPr>
+          <a:xfrm>
+            <a:off x="4742017" y="6459785"/>
+            <a:ext cx="5105169" cy="365125"/>
+          </a:xfrm>
+        </p:spPr>
+        <p:txBody>
+          <a:bodyPr>
+            <a:normAutofit/>
+          </a:bodyPr>
+          <a:lstStyle/>
+          <a:p>
+            <a:pPr algn="l">
+              <a:spcAft>
+                <a:spcPts val="600"/>
+              </a:spcAft>
+            </a:pPr>
+            <a:r>
+              <a:rPr lang="fr-FR">
+                <a:solidFill>
+                  <a:schemeClr val="tx2"/>
+                </a:solidFill>
+              </a:rPr>
+              <a:t>Sylvain ALLAIN</a:t>
+            </a:r>
+          </a:p>
+        </p:txBody>
+      </p:sp>
+      <p:sp>
+        <p:nvSpPr>
+          <p:cNvPr id="6" name="Espace réservé du numéro de diapositive 5">
+            <a:extLst>
+              <a:ext uri="{FF2B5EF4-FFF2-40B4-BE49-F238E27FC236}">
+                <a16:creationId xmlns:a16="http://schemas.microsoft.com/office/drawing/2014/main" id="{6D09E641-676B-428D-82B8-AED15902C3A9}"/>
+              </a:ext>
+            </a:extLst>
+          </p:cNvPr>
+          <p:cNvSpPr>
+            <a:spLocks noGrp="1"/>
+          </p:cNvSpPr>
+          <p:nvPr>
+            <p:ph type="sldNum" sz="quarter" idx="12"/>
+          </p:nvPr>
+        </p:nvSpPr>
+        <p:spPr>
+          <a:xfrm>
+            <a:off x="10123055" y="6459785"/>
+            <a:ext cx="1089428" cy="365125"/>
+          </a:xfrm>
+        </p:spPr>
+        <p:txBody>
+          <a:bodyPr>
+            <a:normAutofit/>
+          </a:bodyPr>
+          <a:lstStyle/>
+          <a:p>
+            <a:pPr>
+              <a:spcAft>
+                <a:spcPts val="600"/>
+              </a:spcAft>
+            </a:pPr>
+            <a:fld id="{7386E8C7-F2FE-4BD9-8CCD-17179851D3F5}" type="slidenum">
+              <a:rPr lang="fr-FR" smtClean="0">
+                <a:solidFill>
+                  <a:schemeClr val="tx2"/>
+                </a:solidFill>
+              </a:rPr>
+              <a:pPr>
+                <a:spcAft>
+                  <a:spcPts val="600"/>
+                </a:spcAft>
+              </a:pPr>
+              <a:t>3</a:t>
+            </a:fld>
+            <a:endParaRPr lang="fr-FR">
+              <a:solidFill>
+                <a:schemeClr val="tx2"/>
+              </a:solidFill>
+            </a:endParaRPr>
+          </a:p>
+        </p:txBody>
+      </p:sp>
+      <p:graphicFrame>
+        <p:nvGraphicFramePr>
+          <p:cNvPr id="10" name="Espace réservé du contenu 7">
+            <a:extLst>
+              <a:ext uri="{FF2B5EF4-FFF2-40B4-BE49-F238E27FC236}">
+                <a16:creationId xmlns:a16="http://schemas.microsoft.com/office/drawing/2014/main" id="{D1256D0D-B8D8-4FAE-9F89-227CA1027549}"/>
+              </a:ext>
+            </a:extLst>
+          </p:cNvPr>
+          <p:cNvGraphicFramePr>
+            <a:graphicFrameLocks noGrp="1"/>
+          </p:cNvGraphicFramePr>
+          <p:nvPr>
+            <p:ph idx="1"/>
+            <p:extLst>
+              <p:ext uri="{D42A27DB-BD31-4B8C-83A1-F6EECF244321}">
+                <p14:modId xmlns:p14="http://schemas.microsoft.com/office/powerpoint/2010/main" val="1531640933"/>
+              </p:ext>
+            </p:extLst>
+          </p:nvPr>
+        </p:nvGraphicFramePr>
+        <p:xfrm>
+          <a:off x="4741863" y="639763"/>
+          <a:ext cx="6797675" cy="5649912"/>
+        </p:xfrm>
+        <a:graphic>
+          <a:graphicData uri="http://schemas.openxmlformats.org/drawingml/2006/diagram">
+            <dgm:relIds xmlns:dgm="http://schemas.openxmlformats.org/drawingml/2006/diagram" xmlns:r="http://schemas.openxmlformats.org/officeDocument/2006/relationships" r:dm="rId2" r:lo="rId3" r:qs="rId4" r:cs="rId5"/>
+          </a:graphicData>
+        </a:graphic>
+      </p:graphicFrame>
+    </p:spTree>
+    <p:extLst>
+      <p:ext uri="{BB962C8B-B14F-4D97-AF65-F5344CB8AC3E}">
+        <p14:creationId xmlns:p14="http://schemas.microsoft.com/office/powerpoint/2010/main" val="4227053855"/>
+      </p:ext>
+    </p:extLst>
+  </p:cSld>
+  <p:clrMapOvr>
+    <a:masterClrMapping/>
+  </p:clrMapOvr>
+</p:sld>
+</file>
+
+<file path=ppt/slides/slide30.xml><?xml version="1.0" encoding="utf-8"?>
 <p:sld xmlns:a="http://schemas.openxmlformats.org/drawingml/2006/main" xmlns:r="http://schemas.openxmlformats.org/officeDocument/2006/relationships" xmlns:p="http://schemas.openxmlformats.org/presentationml/2006/main">
   <p:cSld>
     <p:bg>
@@ -29121,14 +30777,9 @@
                 <a:spcPts val="600"/>
               </a:spcAft>
             </a:pPr>
-            <a:fld id="{EE75921B-C4F6-4949-BEE6-7B8822AEE9B3}" type="datetime1">
-              <a:rPr lang="en-US" smtClean="0"/>
-              <a:pPr>
-                <a:spcAft>
-                  <a:spcPts val="600"/>
-                </a:spcAft>
-              </a:pPr>
-              <a:t>6/8/2020</a:t>
+            <a:fld id="{511802BA-D284-442D-AE5F-A06E12DB7CA8}" type="datetime1">
+              <a:rPr lang="fr-FR" smtClean="0"/>
+              <a:t>23/06/2020</a:t>
             </a:fld>
             <a:endParaRPr lang="en-US"/>
           </a:p>
@@ -29221,7 +30872,7 @@
                   <a:spcPts val="600"/>
                 </a:spcAft>
               </a:pPr>
-              <a:t>29</a:t>
+              <a:t>30</a:t>
             </a:fld>
             <a:endParaRPr lang="en-US"/>
           </a:p>
@@ -29279,428 +30930,6 @@
 </p:sld>
 </file>
 
-<file path=ppt/slides/slide3.xml><?xml version="1.0" encoding="utf-8"?>
-<p:sld xmlns:a="http://schemas.openxmlformats.org/drawingml/2006/main" xmlns:r="http://schemas.openxmlformats.org/officeDocument/2006/relationships" xmlns:p="http://schemas.openxmlformats.org/presentationml/2006/main">
-  <p:cSld>
-    <p:bg>
-      <p:bgPr>
-        <a:solidFill>
-          <a:schemeClr val="bg1"/>
-        </a:solidFill>
-        <a:effectLst/>
-      </p:bgPr>
-    </p:bg>
-    <p:spTree>
-      <p:nvGrpSpPr>
-        <p:cNvPr id="1" name=""/>
-        <p:cNvGrpSpPr/>
-        <p:nvPr/>
-      </p:nvGrpSpPr>
-      <p:grpSpPr>
-        <a:xfrm>
-          <a:off x="0" y="0"/>
-          <a:ext cx="0" cy="0"/>
-          <a:chOff x="0" y="0"/>
-          <a:chExt cx="0" cy="0"/>
-        </a:xfrm>
-      </p:grpSpPr>
-      <p:sp useBgFill="1">
-        <p:nvSpPr>
-          <p:cNvPr id="32" name="Rectangle 31">
-            <a:extLst>
-              <a:ext uri="{FF2B5EF4-FFF2-40B4-BE49-F238E27FC236}">
-                <a16:creationId xmlns:a16="http://schemas.microsoft.com/office/drawing/2014/main" id="{9F5E263C-FB7E-4A3E-AD04-5140CD3D1D97}"/>
-              </a:ext>
-              <a:ext uri="{C183D7F6-B498-43B3-948B-1728B52AA6E4}">
-                <adec:decorative xmlns:adec="http://schemas.microsoft.com/office/drawing/2017/decorative" val="1"/>
-              </a:ext>
-            </a:extLst>
-          </p:cNvPr>
-          <p:cNvSpPr>
-            <a:spLocks noGrp="1" noRot="1" noChangeAspect="1" noMove="1" noResize="1" noEditPoints="1" noAdjustHandles="1" noChangeArrowheads="1" noChangeShapeType="1" noTextEdit="1"/>
-          </p:cNvSpPr>
-          <p:nvPr>
-            <p:extLst>
-              <p:ext uri="{386F3935-93C4-4BCD-93E2-E3B085C9AB24}">
-                <p16:designElem xmlns:p16="http://schemas.microsoft.com/office/powerpoint/2015/main" val="1"/>
-              </p:ext>
-            </p:extLst>
-          </p:nvPr>
-        </p:nvSpPr>
-        <p:spPr>
-          <a:xfrm>
-            <a:off x="0" y="0"/>
-            <a:ext cx="12186315" cy="6858000"/>
-          </a:xfrm>
-          <a:prstGeom prst="rect">
-            <a:avLst/>
-          </a:prstGeom>
-          <a:ln>
-            <a:noFill/>
-          </a:ln>
-        </p:spPr>
-        <p:style>
-          <a:lnRef idx="2">
-            <a:schemeClr val="accent6">
-              <a:shade val="50000"/>
-            </a:schemeClr>
-          </a:lnRef>
-          <a:fillRef idx="1001">
-            <a:schemeClr val="lt1"/>
-          </a:fillRef>
-          <a:effectRef idx="0">
-            <a:schemeClr val="accent6"/>
-          </a:effectRef>
-          <a:fontRef idx="minor">
-            <a:schemeClr val="lt1"/>
-          </a:fontRef>
-        </p:style>
-        <p:txBody>
-          <a:bodyPr rtlCol="0" anchor="ctr"/>
-          <a:lstStyle/>
-          <a:p>
-            <a:pPr algn="ctr"/>
-            <a:endParaRPr lang="en-US"/>
-          </a:p>
-        </p:txBody>
-      </p:sp>
-      <p:sp>
-        <p:nvSpPr>
-          <p:cNvPr id="34" name="Rectangle 33">
-            <a:extLst>
-              <a:ext uri="{FF2B5EF4-FFF2-40B4-BE49-F238E27FC236}">
-                <a16:creationId xmlns:a16="http://schemas.microsoft.com/office/drawing/2014/main" id="{9E65ED8C-90F7-4EB0-ACCB-64AEF411E8B9}"/>
-              </a:ext>
-              <a:ext uri="{C183D7F6-B498-43B3-948B-1728B52AA6E4}">
-                <adec:decorative xmlns:adec="http://schemas.microsoft.com/office/drawing/2017/decorative" val="1"/>
-              </a:ext>
-            </a:extLst>
-          </p:cNvPr>
-          <p:cNvSpPr>
-            <a:spLocks noGrp="1" noRot="1" noChangeAspect="1" noMove="1" noResize="1" noEditPoints="1" noAdjustHandles="1" noChangeArrowheads="1" noChangeShapeType="1" noTextEdit="1"/>
-          </p:cNvSpPr>
-          <p:nvPr>
-            <p:extLst>
-              <p:ext uri="{386F3935-93C4-4BCD-93E2-E3B085C9AB24}">
-                <p16:designElem xmlns:p16="http://schemas.microsoft.com/office/powerpoint/2015/main" val="1"/>
-              </p:ext>
-            </p:extLst>
-          </p:nvPr>
-        </p:nvSpPr>
-        <p:spPr>
-          <a:xfrm>
-            <a:off x="16" y="0"/>
-            <a:ext cx="4050791" cy="6858000"/>
-          </a:xfrm>
-          <a:prstGeom prst="rect">
-            <a:avLst/>
-          </a:prstGeom>
-          <a:solidFill>
-            <a:schemeClr val="accent2"/>
-          </a:solidFill>
-          <a:ln>
-            <a:noFill/>
-          </a:ln>
-        </p:spPr>
-        <p:style>
-          <a:lnRef idx="2">
-            <a:schemeClr val="accent1">
-              <a:shade val="50000"/>
-            </a:schemeClr>
-          </a:lnRef>
-          <a:fillRef idx="1">
-            <a:schemeClr val="accent1"/>
-          </a:fillRef>
-          <a:effectRef idx="0">
-            <a:schemeClr val="accent1"/>
-          </a:effectRef>
-          <a:fontRef idx="minor">
-            <a:schemeClr val="lt1"/>
-          </a:fontRef>
-        </p:style>
-      </p:sp>
-      <p:sp>
-        <p:nvSpPr>
-          <p:cNvPr id="7" name="Titre 6">
-            <a:extLst>
-              <a:ext uri="{FF2B5EF4-FFF2-40B4-BE49-F238E27FC236}">
-                <a16:creationId xmlns:a16="http://schemas.microsoft.com/office/drawing/2014/main" id="{8B098FDD-3C78-425B-AFEC-EE9C45D42833}"/>
-              </a:ext>
-            </a:extLst>
-          </p:cNvPr>
-          <p:cNvSpPr>
-            <a:spLocks noGrp="1"/>
-          </p:cNvSpPr>
-          <p:nvPr>
-            <p:ph type="title"/>
-          </p:nvPr>
-        </p:nvSpPr>
-        <p:spPr>
-          <a:xfrm>
-            <a:off x="492370" y="516835"/>
-            <a:ext cx="3084844" cy="5772840"/>
-          </a:xfrm>
-        </p:spPr>
-        <p:txBody>
-          <a:bodyPr anchor="ctr">
-            <a:normAutofit/>
-          </a:bodyPr>
-          <a:lstStyle/>
-          <a:p>
-            <a:r>
-              <a:rPr lang="fr-FR" sz="3600">
-                <a:solidFill>
-                  <a:srgbClr val="FFFFFF"/>
-                </a:solidFill>
-              </a:rPr>
-              <a:t>Contexte</a:t>
-            </a:r>
-          </a:p>
-        </p:txBody>
-      </p:sp>
-      <p:sp>
-        <p:nvSpPr>
-          <p:cNvPr id="36" name="Rectangle 35">
-            <a:extLst>
-              <a:ext uri="{FF2B5EF4-FFF2-40B4-BE49-F238E27FC236}">
-                <a16:creationId xmlns:a16="http://schemas.microsoft.com/office/drawing/2014/main" id="{6604E3BF-88F7-4D19-BEC9-8486966EA467}"/>
-              </a:ext>
-              <a:ext uri="{C183D7F6-B498-43B3-948B-1728B52AA6E4}">
-                <adec:decorative xmlns:adec="http://schemas.microsoft.com/office/drawing/2017/decorative" val="1"/>
-              </a:ext>
-            </a:extLst>
-          </p:cNvPr>
-          <p:cNvSpPr>
-            <a:spLocks noGrp="1" noRot="1" noChangeAspect="1" noMove="1" noResize="1" noEditPoints="1" noAdjustHandles="1" noChangeArrowheads="1" noChangeShapeType="1" noTextEdit="1"/>
-          </p:cNvSpPr>
-          <p:nvPr>
-            <p:extLst>
-              <p:ext uri="{386F3935-93C4-4BCD-93E2-E3B085C9AB24}">
-                <p16:designElem xmlns:p16="http://schemas.microsoft.com/office/powerpoint/2015/main" val="1"/>
-              </p:ext>
-            </p:extLst>
-          </p:nvPr>
-        </p:nvSpPr>
-        <p:spPr>
-          <a:xfrm>
-            <a:off x="4040071" y="0"/>
-            <a:ext cx="64008" cy="6858000"/>
-          </a:xfrm>
-          <a:prstGeom prst="rect">
-            <a:avLst/>
-          </a:prstGeom>
-          <a:solidFill>
-            <a:schemeClr val="accent1"/>
-          </a:solidFill>
-          <a:ln>
-            <a:noFill/>
-          </a:ln>
-        </p:spPr>
-        <p:style>
-          <a:lnRef idx="2">
-            <a:schemeClr val="accent1">
-              <a:shade val="50000"/>
-            </a:schemeClr>
-          </a:lnRef>
-          <a:fillRef idx="1">
-            <a:schemeClr val="accent1"/>
-          </a:fillRef>
-          <a:effectRef idx="0">
-            <a:schemeClr val="accent1"/>
-          </a:effectRef>
-          <a:fontRef idx="minor">
-            <a:schemeClr val="lt1"/>
-          </a:fontRef>
-        </p:style>
-      </p:sp>
-      <p:sp>
-        <p:nvSpPr>
-          <p:cNvPr id="4" name="Espace réservé de la date 3">
-            <a:extLst>
-              <a:ext uri="{FF2B5EF4-FFF2-40B4-BE49-F238E27FC236}">
-                <a16:creationId xmlns:a16="http://schemas.microsoft.com/office/drawing/2014/main" id="{093EFC05-08DC-4096-986B-A28CD7D52088}"/>
-              </a:ext>
-            </a:extLst>
-          </p:cNvPr>
-          <p:cNvSpPr>
-            <a:spLocks noGrp="1"/>
-          </p:cNvSpPr>
-          <p:nvPr>
-            <p:ph type="dt" sz="half" idx="10"/>
-          </p:nvPr>
-        </p:nvSpPr>
-        <p:spPr>
-          <a:xfrm>
-            <a:off x="492370" y="6459785"/>
-            <a:ext cx="1735371" cy="365125"/>
-          </a:xfrm>
-        </p:spPr>
-        <p:txBody>
-          <a:bodyPr>
-            <a:normAutofit/>
-          </a:bodyPr>
-          <a:lstStyle/>
-          <a:p>
-            <a:pPr>
-              <a:spcAft>
-                <a:spcPts val="600"/>
-              </a:spcAft>
-            </a:pPr>
-            <a:fld id="{EE75921B-C4F6-4949-BEE6-7B8822AEE9B3}" type="datetime1">
-              <a:rPr lang="fr-FR" smtClean="0"/>
-              <a:pPr>
-                <a:spcAft>
-                  <a:spcPts val="600"/>
-                </a:spcAft>
-              </a:pPr>
-              <a:t>08/06/2020</a:t>
-            </a:fld>
-            <a:endParaRPr lang="fr-FR"/>
-          </a:p>
-        </p:txBody>
-      </p:sp>
-      <p:sp>
-        <p:nvSpPr>
-          <p:cNvPr id="5" name="Espace réservé du pied de page 4">
-            <a:extLst>
-              <a:ext uri="{FF2B5EF4-FFF2-40B4-BE49-F238E27FC236}">
-                <a16:creationId xmlns:a16="http://schemas.microsoft.com/office/drawing/2014/main" id="{DCFF5CD2-805F-4C3A-BB99-2A1794D98820}"/>
-              </a:ext>
-            </a:extLst>
-          </p:cNvPr>
-          <p:cNvSpPr>
-            <a:spLocks noGrp="1"/>
-          </p:cNvSpPr>
-          <p:nvPr>
-            <p:ph type="ftr" sz="quarter" idx="11"/>
-          </p:nvPr>
-        </p:nvSpPr>
-        <p:spPr>
-          <a:xfrm>
-            <a:off x="4742017" y="6459785"/>
-            <a:ext cx="5105169" cy="365125"/>
-          </a:xfrm>
-        </p:spPr>
-        <p:txBody>
-          <a:bodyPr>
-            <a:normAutofit/>
-          </a:bodyPr>
-          <a:lstStyle/>
-          <a:p>
-            <a:pPr algn="l">
-              <a:spcAft>
-                <a:spcPts val="600"/>
-              </a:spcAft>
-            </a:pPr>
-            <a:r>
-              <a:rPr lang="fr-FR">
-                <a:solidFill>
-                  <a:schemeClr val="tx2"/>
-                </a:solidFill>
-              </a:rPr>
-              <a:t>Sylvain ALLAIN</a:t>
-            </a:r>
-          </a:p>
-        </p:txBody>
-      </p:sp>
-      <p:sp>
-        <p:nvSpPr>
-          <p:cNvPr id="6" name="Espace réservé du numéro de diapositive 5">
-            <a:extLst>
-              <a:ext uri="{FF2B5EF4-FFF2-40B4-BE49-F238E27FC236}">
-                <a16:creationId xmlns:a16="http://schemas.microsoft.com/office/drawing/2014/main" id="{6D09E641-676B-428D-82B8-AED15902C3A9}"/>
-              </a:ext>
-            </a:extLst>
-          </p:cNvPr>
-          <p:cNvSpPr>
-            <a:spLocks noGrp="1"/>
-          </p:cNvSpPr>
-          <p:nvPr>
-            <p:ph type="sldNum" sz="quarter" idx="12"/>
-          </p:nvPr>
-        </p:nvSpPr>
-        <p:spPr>
-          <a:xfrm>
-            <a:off x="10123055" y="6459785"/>
-            <a:ext cx="1089428" cy="365125"/>
-          </a:xfrm>
-        </p:spPr>
-        <p:txBody>
-          <a:bodyPr>
-            <a:normAutofit/>
-          </a:bodyPr>
-          <a:lstStyle/>
-          <a:p>
-            <a:pPr>
-              <a:spcAft>
-                <a:spcPts val="600"/>
-              </a:spcAft>
-            </a:pPr>
-            <a:fld id="{7386E8C7-F2FE-4BD9-8CCD-17179851D3F5}" type="slidenum">
-              <a:rPr lang="fr-FR" smtClean="0">
-                <a:solidFill>
-                  <a:schemeClr val="tx2"/>
-                </a:solidFill>
-              </a:rPr>
-              <a:pPr>
-                <a:spcAft>
-                  <a:spcPts val="600"/>
-                </a:spcAft>
-              </a:pPr>
-              <a:t>3</a:t>
-            </a:fld>
-            <a:endParaRPr lang="fr-FR">
-              <a:solidFill>
-                <a:schemeClr val="tx2"/>
-              </a:solidFill>
-            </a:endParaRPr>
-          </a:p>
-        </p:txBody>
-      </p:sp>
-      <p:graphicFrame>
-        <p:nvGraphicFramePr>
-          <p:cNvPr id="10" name="Espace réservé du contenu 7">
-            <a:extLst>
-              <a:ext uri="{FF2B5EF4-FFF2-40B4-BE49-F238E27FC236}">
-                <a16:creationId xmlns:a16="http://schemas.microsoft.com/office/drawing/2014/main" id="{D1256D0D-B8D8-4FAE-9F89-227CA1027549}"/>
-              </a:ext>
-            </a:extLst>
-          </p:cNvPr>
-          <p:cNvGraphicFramePr>
-            <a:graphicFrameLocks noGrp="1"/>
-          </p:cNvGraphicFramePr>
-          <p:nvPr>
-            <p:ph idx="1"/>
-            <p:extLst>
-              <p:ext uri="{D42A27DB-BD31-4B8C-83A1-F6EECF244321}">
-                <p14:modId xmlns:p14="http://schemas.microsoft.com/office/powerpoint/2010/main" val="1531640933"/>
-              </p:ext>
-            </p:extLst>
-          </p:nvPr>
-        </p:nvGraphicFramePr>
-        <p:xfrm>
-          <a:off x="4741863" y="639763"/>
-          <a:ext cx="6797675" cy="5649912"/>
-        </p:xfrm>
-        <a:graphic>
-          <a:graphicData uri="http://schemas.openxmlformats.org/drawingml/2006/diagram">
-            <dgm:relIds xmlns:dgm="http://schemas.openxmlformats.org/drawingml/2006/diagram" xmlns:r="http://schemas.openxmlformats.org/officeDocument/2006/relationships" r:dm="rId2" r:lo="rId3" r:qs="rId4" r:cs="rId5"/>
-          </a:graphicData>
-        </a:graphic>
-      </p:graphicFrame>
-    </p:spTree>
-    <p:extLst>
-      <p:ext uri="{BB962C8B-B14F-4D97-AF65-F5344CB8AC3E}">
-        <p14:creationId xmlns:p14="http://schemas.microsoft.com/office/powerpoint/2010/main" val="4227053855"/>
-      </p:ext>
-    </p:extLst>
-  </p:cSld>
-  <p:clrMapOvr>
-    <a:masterClrMapping/>
-  </p:clrMapOvr>
-</p:sld>
-</file>
-
 <file path=ppt/slides/slide4.xml><?xml version="1.0" encoding="utf-8"?>
 <p:sld xmlns:a="http://schemas.openxmlformats.org/drawingml/2006/main" xmlns:r="http://schemas.openxmlformats.org/officeDocument/2006/relationships" xmlns:p="http://schemas.openxmlformats.org/presentationml/2006/main">
   <p:cSld>
@@ -29739,9 +30968,9 @@
           <a:bodyPr/>
           <a:lstStyle/>
           <a:p>
-            <a:fld id="{17B14172-D5F5-4BFB-89B6-FE98C0A91CE9}" type="datetime1">
+            <a:fld id="{F46F67FB-B6B1-41BB-95F9-7277CA4BE41C}" type="datetime1">
               <a:rPr lang="fr-FR" smtClean="0"/>
-              <a:t>08/06/2020</a:t>
+              <a:t>23/06/2020</a:t>
             </a:fld>
             <a:endParaRPr lang="fr-FR"/>
           </a:p>
@@ -31266,9 +32495,9 @@
           <a:bodyPr/>
           <a:lstStyle/>
           <a:p>
-            <a:fld id="{17B14172-D5F5-4BFB-89B6-FE98C0A91CE9}" type="datetime1">
+            <a:fld id="{41DFC34F-19CB-4FD7-9B53-2089DB3053B5}" type="datetime1">
               <a:rPr lang="fr-FR" smtClean="0"/>
-              <a:t>08/06/2020</a:t>
+              <a:t>23/06/2020</a:t>
             </a:fld>
             <a:endParaRPr lang="fr-FR"/>
           </a:p>
@@ -32720,9 +33949,9 @@
           <a:bodyPr/>
           <a:lstStyle/>
           <a:p>
-            <a:fld id="{17B14172-D5F5-4BFB-89B6-FE98C0A91CE9}" type="datetime1">
+            <a:fld id="{89AEB0CD-A849-4603-A896-48F13E66C61D}" type="datetime1">
               <a:rPr lang="fr-FR" smtClean="0"/>
-              <a:t>08/06/2020</a:t>
+              <a:t>23/06/2020</a:t>
             </a:fld>
             <a:endParaRPr lang="fr-FR"/>
           </a:p>
@@ -34694,14 +35923,9 @@
                 <a:spcPts val="600"/>
               </a:spcAft>
             </a:pPr>
-            <a:fld id="{772202B7-1C66-4DE8-B9AF-37C9BE30BA80}" type="datetime1">
-              <a:rPr lang="en-US" smtClean="0"/>
-              <a:pPr>
-                <a:spcAft>
-                  <a:spcPts val="600"/>
-                </a:spcAft>
-              </a:pPr>
-              <a:t>6/8/2020</a:t>
+            <a:fld id="{CA4C4661-7D37-449A-B4AC-F3C711951146}" type="datetime1">
+              <a:rPr lang="fr-FR" smtClean="0"/>
+              <a:t>23/06/2020</a:t>
             </a:fld>
             <a:endParaRPr lang="en-US"/>
           </a:p>
@@ -35341,14 +36565,9 @@
                 <a:spcPts val="600"/>
               </a:spcAft>
             </a:pPr>
-            <a:fld id="{EE75921B-C4F6-4949-BEE6-7B8822AEE9B3}" type="datetime1">
-              <a:rPr lang="en-US" smtClean="0"/>
-              <a:pPr defTabSz="914400">
-                <a:spcAft>
-                  <a:spcPts val="600"/>
-                </a:spcAft>
-              </a:pPr>
-              <a:t>6/8/2020</a:t>
+            <a:fld id="{7B6C8970-ECC8-4DB3-A9F3-63888E75A85A}" type="datetime1">
+              <a:rPr lang="fr-FR" smtClean="0"/>
+              <a:t>23/06/2020</a:t>
             </a:fld>
             <a:endParaRPr lang="en-US"/>
           </a:p>
@@ -35988,14 +37207,9 @@
                 <a:spcPts val="600"/>
               </a:spcAft>
             </a:pPr>
-            <a:fld id="{17B14172-D5F5-4BFB-89B6-FE98C0A91CE9}" type="datetime1">
-              <a:rPr lang="en-US" smtClean="0"/>
-              <a:pPr defTabSz="914400">
-                <a:spcAft>
-                  <a:spcPts val="600"/>
-                </a:spcAft>
-              </a:pPr>
-              <a:t>6/8/2020</a:t>
+            <a:fld id="{31A3E8C7-2242-4278-B97D-686D79C1DAEF}" type="datetime1">
+              <a:rPr lang="fr-FR" smtClean="0"/>
+              <a:t>23/06/2020</a:t>
             </a:fld>
             <a:endParaRPr lang="en-US"/>
           </a:p>

</xml_diff>